<commit_message>
added "rpId" to the diagrams
</commit_message>
<xml_diff>
--- a/fido-wallet-a.rundgren.pptx
+++ b/fido-wallet-a.rundgren.pptx
@@ -161,7 +161,7 @@
             <a:pPr algn="r"/>
             <a:r>
               <a:rPr lang="en-US" sz="800" noProof="1"/>
-              <a:t>A.Rundgren 2022-01-10</a:t>
+              <a:t>A.Rundgren 2022-02-10</a:t>
             </a:r>
           </a:p>
         </p:txBody>
@@ -427,7 +427,7 @@
           <a:p>
             <a:fld id="{FAE6055B-ABBD-4C0D-84D8-CCE0D097BF9D}" type="datetimeFigureOut">
               <a:rPr lang="en-US" smtClean="0"/>
-              <a:t>2022-10-01</a:t>
+              <a:t>2022-10-02</a:t>
             </a:fld>
             <a:endParaRPr lang="en-US"/>
           </a:p>
@@ -635,7 +635,7 @@
           <a:p>
             <a:fld id="{FAE6055B-ABBD-4C0D-84D8-CCE0D097BF9D}" type="datetimeFigureOut">
               <a:rPr lang="en-US" smtClean="0"/>
-              <a:t>2022-10-01</a:t>
+              <a:t>2022-10-02</a:t>
             </a:fld>
             <a:endParaRPr lang="en-US"/>
           </a:p>
@@ -833,7 +833,7 @@
           <a:p>
             <a:fld id="{FAE6055B-ABBD-4C0D-84D8-CCE0D097BF9D}" type="datetimeFigureOut">
               <a:rPr lang="en-US" smtClean="0"/>
-              <a:t>2022-10-01</a:t>
+              <a:t>2022-10-02</a:t>
             </a:fld>
             <a:endParaRPr lang="en-US"/>
           </a:p>
@@ -1108,7 +1108,7 @@
           <a:p>
             <a:fld id="{FAE6055B-ABBD-4C0D-84D8-CCE0D097BF9D}" type="datetimeFigureOut">
               <a:rPr lang="en-US" smtClean="0"/>
-              <a:t>2022-10-01</a:t>
+              <a:t>2022-10-02</a:t>
             </a:fld>
             <a:endParaRPr lang="en-US"/>
           </a:p>
@@ -1373,7 +1373,7 @@
           <a:p>
             <a:fld id="{FAE6055B-ABBD-4C0D-84D8-CCE0D097BF9D}" type="datetimeFigureOut">
               <a:rPr lang="en-US" smtClean="0"/>
-              <a:t>2022-10-01</a:t>
+              <a:t>2022-10-02</a:t>
             </a:fld>
             <a:endParaRPr lang="en-US"/>
           </a:p>
@@ -1785,7 +1785,7 @@
           <a:p>
             <a:fld id="{FAE6055B-ABBD-4C0D-84D8-CCE0D097BF9D}" type="datetimeFigureOut">
               <a:rPr lang="en-US" smtClean="0"/>
-              <a:t>2022-10-01</a:t>
+              <a:t>2022-10-02</a:t>
             </a:fld>
             <a:endParaRPr lang="en-US"/>
           </a:p>
@@ -1926,7 +1926,7 @@
           <a:p>
             <a:fld id="{FAE6055B-ABBD-4C0D-84D8-CCE0D097BF9D}" type="datetimeFigureOut">
               <a:rPr lang="en-US" smtClean="0"/>
-              <a:t>2022-10-01</a:t>
+              <a:t>2022-10-02</a:t>
             </a:fld>
             <a:endParaRPr lang="en-US"/>
           </a:p>
@@ -2039,7 +2039,7 @@
           <a:p>
             <a:fld id="{FAE6055B-ABBD-4C0D-84D8-CCE0D097BF9D}" type="datetimeFigureOut">
               <a:rPr lang="en-US" smtClean="0"/>
-              <a:t>2022-10-01</a:t>
+              <a:t>2022-10-02</a:t>
             </a:fld>
             <a:endParaRPr lang="en-US"/>
           </a:p>
@@ -2350,7 +2350,7 @@
           <a:p>
             <a:fld id="{FAE6055B-ABBD-4C0D-84D8-CCE0D097BF9D}" type="datetimeFigureOut">
               <a:rPr lang="en-US" smtClean="0"/>
-              <a:t>2022-10-01</a:t>
+              <a:t>2022-10-02</a:t>
             </a:fld>
             <a:endParaRPr lang="en-US"/>
           </a:p>
@@ -2638,7 +2638,7 @@
           <a:p>
             <a:fld id="{FAE6055B-ABBD-4C0D-84D8-CCE0D097BF9D}" type="datetimeFigureOut">
               <a:rPr lang="en-US" smtClean="0"/>
-              <a:t>2022-10-01</a:t>
+              <a:t>2022-10-02</a:t>
             </a:fld>
             <a:endParaRPr lang="en-US"/>
           </a:p>
@@ -2879,7 +2879,7 @@
           <a:p>
             <a:fld id="{FAE6055B-ABBD-4C0D-84D8-CCE0D097BF9D}" type="datetimeFigureOut">
               <a:rPr lang="en-US" smtClean="0"/>
-              <a:t>2022-10-01</a:t>
+              <a:t>2022-10-02</a:t>
             </a:fld>
             <a:endParaRPr lang="en-US"/>
           </a:p>
@@ -4738,8 +4738,8 @@
         </p:nvSpPr>
         <p:spPr>
           <a:xfrm>
-            <a:off x="4386295" y="4280023"/>
-            <a:ext cx="1463923" cy="1548000"/>
+            <a:off x="4368664" y="3994256"/>
+            <a:ext cx="1505591" cy="2232000"/>
           </a:xfrm>
           <a:prstGeom prst="roundRect">
             <a:avLst>
@@ -4807,6 +4807,46 @@
               </a:rPr>
               <a:t>(new)</a:t>
             </a:r>
+            <a:br>
+              <a:rPr lang="en-US" sz="1600" dirty="0">
+                <a:solidFill>
+                  <a:schemeClr val="tx1"/>
+                </a:solidFill>
+              </a:rPr>
+            </a:br>
+            <a:endParaRPr lang="en-US" sz="1600" dirty="0">
+              <a:solidFill>
+                <a:schemeClr val="tx1"/>
+              </a:solidFill>
+            </a:endParaRPr>
+          </a:p>
+          <a:p>
+            <a:pPr algn="ctr"/>
+            <a:r>
+              <a:rPr lang="en-US" sz="1600" dirty="0">
+                <a:solidFill>
+                  <a:schemeClr val="tx1"/>
+                </a:solidFill>
+              </a:rPr>
+              <a:t>Provides </a:t>
+            </a:r>
+            <a:r>
+              <a:rPr lang="en-US" sz="1400" dirty="0" err="1">
+                <a:solidFill>
+                  <a:schemeClr val="tx1"/>
+                </a:solidFill>
+                <a:latin typeface="Courier New" panose="02070309020205020404" pitchFamily="49" charset="0"/>
+                <a:cs typeface="Courier New" panose="02070309020205020404" pitchFamily="49" charset="0"/>
+              </a:rPr>
+              <a:t>rpId</a:t>
+            </a:r>
+            <a:endParaRPr lang="en-US" sz="1400" dirty="0">
+              <a:solidFill>
+                <a:schemeClr val="tx1"/>
+              </a:solidFill>
+              <a:latin typeface="Courier New" panose="02070309020205020404" pitchFamily="49" charset="0"/>
+              <a:cs typeface="Courier New" panose="02070309020205020404" pitchFamily="49" charset="0"/>
+            </a:endParaRPr>
           </a:p>
         </p:txBody>
       </p:sp>
@@ -4824,8 +4864,8 @@
         </p:nvSpPr>
         <p:spPr>
           <a:xfrm>
-            <a:off x="2468689" y="4955594"/>
-            <a:ext cx="1134000" cy="154800"/>
+            <a:off x="2190397" y="5432667"/>
+            <a:ext cx="1422000" cy="154800"/>
           </a:xfrm>
           <a:prstGeom prst="leftRightArrow">
             <a:avLst>
@@ -4887,7 +4927,7 @@
         </p:nvSpPr>
         <p:spPr>
           <a:xfrm>
-            <a:off x="2663646" y="4693560"/>
+            <a:off x="2577515" y="5170632"/>
             <a:ext cx="706668" cy="338554"/>
           </a:xfrm>
           <a:prstGeom prst="rect">
@@ -5081,8 +5121,8 @@
         </p:nvCxnSpPr>
         <p:spPr>
           <a:xfrm flipH="1">
-            <a:off x="2179381" y="4528250"/>
-            <a:ext cx="2214000" cy="0"/>
+            <a:off x="2179381" y="4240019"/>
+            <a:ext cx="2178000" cy="0"/>
           </a:xfrm>
           <a:prstGeom prst="straightConnector1">
             <a:avLst/>
@@ -5201,8 +5241,8 @@
         </p:nvCxnSpPr>
         <p:spPr>
           <a:xfrm>
-            <a:off x="2156689" y="5545352"/>
-            <a:ext cx="2206800" cy="0"/>
+            <a:off x="2156689" y="5923034"/>
+            <a:ext cx="2178000" cy="0"/>
           </a:xfrm>
           <a:prstGeom prst="straightConnector1">
             <a:avLst/>
@@ -5243,8 +5283,8 @@
         </p:nvSpPr>
         <p:spPr>
           <a:xfrm>
-            <a:off x="959589" y="4776400"/>
-            <a:ext cx="1473480" cy="505267"/>
+            <a:off x="1148139" y="4547803"/>
+            <a:ext cx="2010487" cy="505267"/>
           </a:xfrm>
           <a:prstGeom prst="rect">
             <a:avLst/>
@@ -5283,7 +5323,7 @@
                 <a:latin typeface="Courier New" panose="02070309020205020404" pitchFamily="49" charset="0"/>
                 <a:cs typeface="Courier New" panose="02070309020205020404" pitchFamily="49" charset="0"/>
               </a:rPr>
-              <a:t>credentialId</a:t>
+              <a:t>credentialId/rpId</a:t>
             </a:r>
             <a:endParaRPr lang="en-US" sz="1600" dirty="0"/>
           </a:p>
@@ -5305,8 +5345,8 @@
         </p:nvCxnSpPr>
         <p:spPr>
           <a:xfrm>
-            <a:off x="5855888" y="5565232"/>
-            <a:ext cx="3456000" cy="684000"/>
+            <a:off x="5875767" y="5923036"/>
+            <a:ext cx="3438000" cy="360000"/>
           </a:xfrm>
           <a:prstGeom prst="bentConnector3">
             <a:avLst/>
@@ -5347,8 +5387,8 @@
         </p:nvCxnSpPr>
         <p:spPr>
           <a:xfrm flipH="1">
-            <a:off x="5873917" y="4531565"/>
-            <a:ext cx="3456000" cy="0"/>
+            <a:off x="5893795" y="4531565"/>
+            <a:ext cx="3438000" cy="0"/>
           </a:xfrm>
           <a:prstGeom prst="straightConnector1">
             <a:avLst/>
@@ -5652,7 +5692,7 @@
         </p:nvSpPr>
         <p:spPr>
           <a:xfrm>
-            <a:off x="2418947" y="4219796"/>
+            <a:off x="2409008" y="3931565"/>
             <a:ext cx="1043683" cy="338554"/>
           </a:xfrm>
           <a:prstGeom prst="rect">
@@ -5688,8 +5728,8 @@
         </p:nvSpPr>
         <p:spPr>
           <a:xfrm>
-            <a:off x="2422262" y="5246837"/>
-            <a:ext cx="1043683" cy="338554"/>
+            <a:off x="2581426" y="5624519"/>
+            <a:ext cx="698846" cy="338554"/>
           </a:xfrm>
           <a:prstGeom prst="rect">
             <a:avLst/>
@@ -5705,7 +5745,7 @@
             <a:pPr algn="ctr"/>
             <a:r>
               <a:rPr lang="en-US" sz="1600" dirty="0"/>
-              <a:t>Wallet API</a:t>
+              <a:t>Result</a:t>
             </a:r>
           </a:p>
         </p:txBody>
@@ -5894,8 +5934,8 @@
         </p:nvSpPr>
         <p:spPr>
           <a:xfrm>
-            <a:off x="6445159" y="4521493"/>
-            <a:ext cx="2357697" cy="553998"/>
+            <a:off x="6439229" y="4521493"/>
+            <a:ext cx="2369558" cy="584775"/>
           </a:xfrm>
           <a:prstGeom prst="rect">
             <a:avLst/>
@@ -5922,6 +5962,19 @@
                 <a:cs typeface="Courier New" panose="02070309020205020404" pitchFamily="49" charset="0"/>
               </a:rPr>
               <a:t>credentialId</a:t>
+            </a:r>
+            <a:r>
+              <a:rPr lang="en-US" sz="1600" noProof="1">
+                <a:cs typeface="Courier New" panose="02070309020205020404" pitchFamily="49" charset="0"/>
+              </a:rPr>
+              <a:t> and </a:t>
+            </a:r>
+            <a:r>
+              <a:rPr lang="en-US" sz="1400" noProof="1">
+                <a:latin typeface="Courier New" panose="02070309020205020404" pitchFamily="49" charset="0"/>
+                <a:cs typeface="Courier New" panose="02070309020205020404" pitchFamily="49" charset="0"/>
+              </a:rPr>
+              <a:t>rpId</a:t>
             </a:r>
           </a:p>
         </p:txBody>
@@ -8293,8 +8346,8 @@
         </p:nvSpPr>
         <p:spPr>
           <a:xfrm>
-            <a:off x="1244539" y="3666535"/>
-            <a:ext cx="1796710" cy="505267"/>
+            <a:off x="1137651" y="3666535"/>
+            <a:ext cx="2010487" cy="505267"/>
           </a:xfrm>
           <a:prstGeom prst="rect">
             <a:avLst/>
@@ -8338,7 +8391,7 @@
                 <a:latin typeface="Courier New" panose="02070309020205020404" pitchFamily="49" charset="0"/>
                 <a:cs typeface="Courier New" panose="02070309020205020404" pitchFamily="49" charset="0"/>
               </a:rPr>
-              <a:t>credentialId</a:t>
+              <a:t>credentialId/rpId</a:t>
             </a:r>
           </a:p>
         </p:txBody>

</xml_diff>

<commit_message>
Added explanation to "rpId"
</commit_message>
<xml_diff>
--- a/fido-wallet-a.rundgren.pptx
+++ b/fido-wallet-a.rundgren.pptx
@@ -4726,132 +4726,6 @@
       </p:sp>
       <p:sp>
         <p:nvSpPr>
-          <p:cNvPr id="25" name="Rectangle: Rounded Corners 24">
-            <a:extLst>
-              <a:ext uri="{FF2B5EF4-FFF2-40B4-BE49-F238E27FC236}">
-                <a16:creationId xmlns:a16="http://schemas.microsoft.com/office/drawing/2014/main" id="{F858109D-CAB8-2160-574D-DD0956353F50}"/>
-              </a:ext>
-            </a:extLst>
-          </p:cNvPr>
-          <p:cNvSpPr/>
-          <p:nvPr/>
-        </p:nvSpPr>
-        <p:spPr>
-          <a:xfrm>
-            <a:off x="4368664" y="3994256"/>
-            <a:ext cx="1505591" cy="2232000"/>
-          </a:xfrm>
-          <a:prstGeom prst="roundRect">
-            <a:avLst>
-              <a:gd name="adj" fmla="val 11108"/>
-            </a:avLst>
-          </a:prstGeom>
-          <a:solidFill>
-            <a:schemeClr val="accent5">
-              <a:lumMod val="20000"/>
-              <a:lumOff val="80000"/>
-            </a:schemeClr>
-          </a:solidFill>
-          <a:ln>
-            <a:solidFill>
-              <a:schemeClr val="tx1">
-                <a:lumMod val="75000"/>
-                <a:lumOff val="25000"/>
-              </a:schemeClr>
-            </a:solidFill>
-          </a:ln>
-        </p:spPr>
-        <p:style>
-          <a:lnRef idx="2">
-            <a:schemeClr val="accent1">
-              <a:shade val="50000"/>
-            </a:schemeClr>
-          </a:lnRef>
-          <a:fillRef idx="1">
-            <a:schemeClr val="accent1"/>
-          </a:fillRef>
-          <a:effectRef idx="0">
-            <a:schemeClr val="accent1"/>
-          </a:effectRef>
-          <a:fontRef idx="minor">
-            <a:schemeClr val="lt1"/>
-          </a:fontRef>
-        </p:style>
-        <p:txBody>
-          <a:bodyPr wrap="none" lIns="72000" tIns="36000" rIns="72000" bIns="36000" rtlCol="0" anchor="ctr">
-            <a:spAutoFit/>
-          </a:bodyPr>
-          <a:lstStyle/>
-          <a:p>
-            <a:pPr algn="ctr"/>
-            <a:r>
-              <a:rPr lang="en-US" sz="1600" dirty="0">
-                <a:solidFill>
-                  <a:schemeClr val="tx1"/>
-                </a:solidFill>
-              </a:rPr>
-              <a:t>Wallet Web API</a:t>
-            </a:r>
-            <a:br>
-              <a:rPr lang="en-US" sz="1600" dirty="0">
-                <a:solidFill>
-                  <a:schemeClr val="tx1"/>
-                </a:solidFill>
-              </a:rPr>
-            </a:br>
-            <a:r>
-              <a:rPr lang="en-US" sz="1600" dirty="0">
-                <a:solidFill>
-                  <a:schemeClr val="tx1"/>
-                </a:solidFill>
-              </a:rPr>
-              <a:t>(new)</a:t>
-            </a:r>
-            <a:br>
-              <a:rPr lang="en-US" sz="1600" dirty="0">
-                <a:solidFill>
-                  <a:schemeClr val="tx1"/>
-                </a:solidFill>
-              </a:rPr>
-            </a:br>
-            <a:endParaRPr lang="en-US" sz="1600" dirty="0">
-              <a:solidFill>
-                <a:schemeClr val="tx1"/>
-              </a:solidFill>
-            </a:endParaRPr>
-          </a:p>
-          <a:p>
-            <a:pPr algn="ctr"/>
-            <a:r>
-              <a:rPr lang="en-US" sz="1600" dirty="0">
-                <a:solidFill>
-                  <a:schemeClr val="tx1"/>
-                </a:solidFill>
-              </a:rPr>
-              <a:t>Provides </a:t>
-            </a:r>
-            <a:r>
-              <a:rPr lang="en-US" sz="1400" dirty="0" err="1">
-                <a:solidFill>
-                  <a:schemeClr val="tx1"/>
-                </a:solidFill>
-                <a:latin typeface="Courier New" panose="02070309020205020404" pitchFamily="49" charset="0"/>
-                <a:cs typeface="Courier New" panose="02070309020205020404" pitchFamily="49" charset="0"/>
-              </a:rPr>
-              <a:t>rpId</a:t>
-            </a:r>
-            <a:endParaRPr lang="en-US" sz="1400" dirty="0">
-              <a:solidFill>
-                <a:schemeClr val="tx1"/>
-              </a:solidFill>
-              <a:latin typeface="Courier New" panose="02070309020205020404" pitchFamily="49" charset="0"/>
-              <a:cs typeface="Courier New" panose="02070309020205020404" pitchFamily="49" charset="0"/>
-            </a:endParaRPr>
-          </a:p>
-        </p:txBody>
-      </p:sp>
-      <p:sp>
-        <p:nvSpPr>
           <p:cNvPr id="31" name="Arrow: Left-Right 30">
             <a:extLst>
               <a:ext uri="{FF2B5EF4-FFF2-40B4-BE49-F238E27FC236}">
@@ -5242,7 +5116,7 @@
         <p:spPr>
           <a:xfrm>
             <a:off x="2156689" y="5923034"/>
-            <a:ext cx="2178000" cy="0"/>
+            <a:ext cx="2106000" cy="0"/>
           </a:xfrm>
           <a:prstGeom prst="straightConnector1">
             <a:avLst/>
@@ -5387,8 +5261,8 @@
         </p:nvCxnSpPr>
         <p:spPr>
           <a:xfrm flipH="1">
-            <a:off x="5893795" y="4531565"/>
-            <a:ext cx="3438000" cy="0"/>
+            <a:off x="5973307" y="4531565"/>
+            <a:ext cx="3366000" cy="0"/>
           </a:xfrm>
           <a:prstGeom prst="straightConnector1">
             <a:avLst/>
@@ -5692,8 +5566,8 @@
         </p:nvSpPr>
         <p:spPr>
           <a:xfrm>
-            <a:off x="2409008" y="3931565"/>
-            <a:ext cx="1043683" cy="338554"/>
+            <a:off x="2462612" y="3959558"/>
+            <a:ext cx="936475" cy="307777"/>
           </a:xfrm>
           <a:prstGeom prst="rect">
             <a:avLst/>
@@ -5708,8 +5582,11 @@
           <a:p>
             <a:pPr algn="ctr"/>
             <a:r>
-              <a:rPr lang="en-US" sz="1600" dirty="0"/>
-              <a:t>Wallet API</a:t>
+              <a:rPr lang="en-US" sz="1400" dirty="0">
+                <a:latin typeface="Courier New" panose="02070309020205020404" pitchFamily="49" charset="0"/>
+                <a:cs typeface="Courier New" panose="02070309020205020404" pitchFamily="49" charset="0"/>
+              </a:rPr>
+              <a:t>store()</a:t>
             </a:r>
           </a:p>
         </p:txBody>
@@ -5975,6 +5852,161 @@
                 <a:cs typeface="Courier New" panose="02070309020205020404" pitchFamily="49" charset="0"/>
               </a:rPr>
               <a:t>rpId</a:t>
+            </a:r>
+          </a:p>
+        </p:txBody>
+      </p:sp>
+      <p:sp>
+        <p:nvSpPr>
+          <p:cNvPr id="25" name="Rectangle: Rounded Corners 24">
+            <a:extLst>
+              <a:ext uri="{FF2B5EF4-FFF2-40B4-BE49-F238E27FC236}">
+                <a16:creationId xmlns:a16="http://schemas.microsoft.com/office/drawing/2014/main" id="{F858109D-CAB8-2160-574D-DD0956353F50}"/>
+              </a:ext>
+            </a:extLst>
+          </p:cNvPr>
+          <p:cNvSpPr/>
+          <p:nvPr/>
+        </p:nvSpPr>
+        <p:spPr>
+          <a:xfrm>
+            <a:off x="4297099" y="3971751"/>
+            <a:ext cx="1648726" cy="2196000"/>
+          </a:xfrm>
+          <a:prstGeom prst="roundRect">
+            <a:avLst>
+              <a:gd name="adj" fmla="val 11108"/>
+            </a:avLst>
+          </a:prstGeom>
+          <a:solidFill>
+            <a:schemeClr val="accent5">
+              <a:lumMod val="20000"/>
+              <a:lumOff val="80000"/>
+            </a:schemeClr>
+          </a:solidFill>
+          <a:ln>
+            <a:solidFill>
+              <a:schemeClr val="tx1">
+                <a:lumMod val="75000"/>
+                <a:lumOff val="25000"/>
+              </a:schemeClr>
+            </a:solidFill>
+          </a:ln>
+        </p:spPr>
+        <p:style>
+          <a:lnRef idx="2">
+            <a:schemeClr val="accent1">
+              <a:shade val="50000"/>
+            </a:schemeClr>
+          </a:lnRef>
+          <a:fillRef idx="1">
+            <a:schemeClr val="accent1"/>
+          </a:fillRef>
+          <a:effectRef idx="0">
+            <a:schemeClr val="accent1"/>
+          </a:effectRef>
+          <a:fontRef idx="minor">
+            <a:schemeClr val="lt1"/>
+          </a:fontRef>
+        </p:style>
+        <p:txBody>
+          <a:bodyPr wrap="none" lIns="72000" tIns="36000" rIns="72000" bIns="36000" rtlCol="0" anchor="ctr">
+            <a:spAutoFit/>
+          </a:bodyPr>
+          <a:lstStyle/>
+          <a:p>
+            <a:pPr algn="ctr"/>
+            <a:r>
+              <a:rPr lang="en-US" sz="1600" dirty="0">
+                <a:solidFill>
+                  <a:schemeClr val="tx1"/>
+                </a:solidFill>
+              </a:rPr>
+              <a:t>Wallet Web API</a:t>
+            </a:r>
+            <a:br>
+              <a:rPr lang="en-US" sz="1600" dirty="0">
+                <a:solidFill>
+                  <a:schemeClr val="tx1"/>
+                </a:solidFill>
+              </a:rPr>
+            </a:br>
+            <a:r>
+              <a:rPr lang="en-US" sz="1600" dirty="0">
+                <a:solidFill>
+                  <a:schemeClr val="tx1"/>
+                </a:solidFill>
+              </a:rPr>
+              <a:t>(new)</a:t>
+            </a:r>
+            <a:br>
+              <a:rPr lang="en-US" sz="1600" dirty="0">
+                <a:solidFill>
+                  <a:schemeClr val="tx1"/>
+                </a:solidFill>
+              </a:rPr>
+            </a:br>
+            <a:endParaRPr lang="en-US" sz="1600" dirty="0">
+              <a:solidFill>
+                <a:schemeClr val="tx1"/>
+              </a:solidFill>
+            </a:endParaRPr>
+          </a:p>
+          <a:p>
+            <a:r>
+              <a:rPr lang="en-US" sz="1600" dirty="0">
+                <a:solidFill>
+                  <a:schemeClr val="tx1"/>
+                </a:solidFill>
+              </a:rPr>
+              <a:t>Provides </a:t>
+            </a:r>
+            <a:r>
+              <a:rPr lang="en-US" sz="1400" dirty="0" err="1">
+                <a:solidFill>
+                  <a:schemeClr val="tx1"/>
+                </a:solidFill>
+                <a:latin typeface="Courier New" panose="02070309020205020404" pitchFamily="49" charset="0"/>
+                <a:cs typeface="Courier New" panose="02070309020205020404" pitchFamily="49" charset="0"/>
+              </a:rPr>
+              <a:t>rpId</a:t>
+            </a:r>
+            <a:r>
+              <a:rPr lang="en-US" sz="1600" dirty="0">
+                <a:solidFill>
+                  <a:schemeClr val="tx1"/>
+                </a:solidFill>
+                <a:cs typeface="Courier New" panose="02070309020205020404" pitchFamily="49" charset="0"/>
+              </a:rPr>
+              <a:t> </a:t>
+            </a:r>
+            <a:br>
+              <a:rPr lang="en-US" sz="1600" dirty="0">
+                <a:solidFill>
+                  <a:schemeClr val="tx1"/>
+                </a:solidFill>
+                <a:cs typeface="Courier New" panose="02070309020205020404" pitchFamily="49" charset="0"/>
+              </a:rPr>
+            </a:br>
+            <a:r>
+              <a:rPr lang="en-US" sz="1600" dirty="0">
+                <a:solidFill>
+                  <a:schemeClr val="tx1"/>
+                </a:solidFill>
+                <a:cs typeface="Courier New" panose="02070309020205020404" pitchFamily="49" charset="0"/>
+              </a:rPr>
+              <a:t>filtering issuers</a:t>
+            </a:r>
+          </a:p>
+          <a:p>
+            <a:r>
+              <a:rPr lang="en-US" sz="1600" dirty="0">
+                <a:solidFill>
+                  <a:schemeClr val="tx1"/>
+                </a:solidFill>
+                <a:cs typeface="Courier New" panose="02070309020205020404" pitchFamily="49" charset="0"/>
+              </a:rPr>
+              <a:t>from each other</a:t>
             </a:r>
           </a:p>
         </p:txBody>
@@ -7872,8 +7904,8 @@
         </p:nvSpPr>
         <p:spPr>
           <a:xfrm>
-            <a:off x="2498278" y="2728383"/>
-            <a:ext cx="829073" cy="307777"/>
+            <a:off x="2451621" y="2728383"/>
+            <a:ext cx="974753" cy="307777"/>
           </a:xfrm>
           <a:prstGeom prst="rect">
             <a:avLst/>
@@ -7881,7 +7913,7 @@
           <a:noFill/>
         </p:spPr>
         <p:txBody>
-          <a:bodyPr wrap="none" rtlCol="0">
+          <a:bodyPr wrap="square" rtlCol="0">
             <a:spAutoFit/>
           </a:bodyPr>
           <a:lstStyle/>
@@ -7892,7 +7924,7 @@
                 <a:latin typeface="Courier New" panose="02070309020205020404" pitchFamily="49" charset="0"/>
                 <a:cs typeface="Courier New" panose="02070309020205020404" pitchFamily="49" charset="0"/>
               </a:rPr>
-              <a:t>Show()</a:t>
+              <a:t>show()</a:t>
             </a:r>
           </a:p>
         </p:txBody>

</xml_diff>

<commit_message>
Added a "," :)
</commit_message>
<xml_diff>
--- a/fido-wallet-a.rundgren.pptx
+++ b/fido-wallet-a.rundgren.pptx
@@ -5116,7 +5116,7 @@
         <p:spPr>
           <a:xfrm>
             <a:off x="2156689" y="5923034"/>
-            <a:ext cx="2106000" cy="0"/>
+            <a:ext cx="2088000" cy="0"/>
           </a:xfrm>
           <a:prstGeom prst="straightConnector1">
             <a:avLst/>
@@ -5261,8 +5261,8 @@
         </p:nvCxnSpPr>
         <p:spPr>
           <a:xfrm flipH="1">
-            <a:off x="5973307" y="4531565"/>
-            <a:ext cx="3366000" cy="0"/>
+            <a:off x="5983246" y="4531565"/>
+            <a:ext cx="3348000" cy="0"/>
           </a:xfrm>
           <a:prstGeom prst="straightConnector1">
             <a:avLst/>
@@ -5870,8 +5870,8 @@
         </p:nvSpPr>
         <p:spPr>
           <a:xfrm>
-            <a:off x="4297099" y="3971751"/>
-            <a:ext cx="1648726" cy="2196000"/>
+            <a:off x="4273630" y="3961833"/>
+            <a:ext cx="1695663" cy="2268000"/>
           </a:xfrm>
           <a:prstGeom prst="roundRect">
             <a:avLst>
@@ -5978,7 +5978,7 @@
                 </a:solidFill>
                 <a:cs typeface="Courier New" panose="02070309020205020404" pitchFamily="49" charset="0"/>
               </a:rPr>
-              <a:t> </a:t>
+              <a:t>,</a:t>
             </a:r>
             <a:br>
               <a:rPr lang="en-US" sz="1600" dirty="0">

</xml_diff>

<commit_message>
Added FIDO (tm) note
</commit_message>
<xml_diff>
--- a/fido-wallet-a.rundgren.pptx
+++ b/fido-wallet-a.rundgren.pptx
@@ -286,6 +286,49 @@
               </a:rPr>
               <a:t>in the public domain</a:t>
             </a:r>
+          </a:p>
+        </p:txBody>
+      </p:sp>
+      <p:sp>
+        <p:nvSpPr>
+          <p:cNvPr id="2" name="TextBox 1">
+            <a:extLst>
+              <a:ext uri="{FF2B5EF4-FFF2-40B4-BE49-F238E27FC236}">
+                <a16:creationId xmlns:a16="http://schemas.microsoft.com/office/drawing/2014/main" id="{93A9E011-1769-1F69-CE9A-6972045B9154}"/>
+              </a:ext>
+            </a:extLst>
+          </p:cNvPr>
+          <p:cNvSpPr txBox="1"/>
+          <p:nvPr userDrawn="1"/>
+        </p:nvSpPr>
+        <p:spPr>
+          <a:xfrm>
+            <a:off x="-6220" y="6644789"/>
+            <a:ext cx="2316660" cy="215444"/>
+          </a:xfrm>
+          <a:prstGeom prst="rect">
+            <a:avLst/>
+          </a:prstGeom>
+          <a:noFill/>
+        </p:spPr>
+        <p:txBody>
+          <a:bodyPr wrap="none" rtlCol="0">
+            <a:spAutoFit/>
+          </a:bodyPr>
+          <a:lstStyle/>
+          <a:p>
+            <a:pPr algn="l"/>
+            <a:r>
+              <a:rPr lang="en-US" sz="800" b="0" i="0" dirty="0">
+                <a:solidFill>
+                  <a:srgbClr val="24292E"/>
+                </a:solidFill>
+                <a:effectLst/>
+                <a:latin typeface="-apple-system"/>
+              </a:rPr>
+              <a:t>FIDO is a registered trademark of the FIDO alliance</a:t>
+            </a:r>
+            <a:endParaRPr lang="en-US" sz="800" noProof="1"/>
           </a:p>
         </p:txBody>
       </p:sp>
@@ -3645,122 +3688,6 @@
           </a:prstGeom>
         </p:spPr>
       </p:pic>
-      <p:grpSp>
-        <p:nvGrpSpPr>
-          <p:cNvPr id="43" name="Group 42">
-            <a:extLst>
-              <a:ext uri="{FF2B5EF4-FFF2-40B4-BE49-F238E27FC236}">
-                <a16:creationId xmlns:a16="http://schemas.microsoft.com/office/drawing/2014/main" id="{25FAD7CA-7106-CECD-BE3B-8933EDA04D97}"/>
-              </a:ext>
-            </a:extLst>
-          </p:cNvPr>
-          <p:cNvGrpSpPr/>
-          <p:nvPr/>
-        </p:nvGrpSpPr>
-        <p:grpSpPr>
-          <a:xfrm>
-            <a:off x="3189170" y="1307580"/>
-            <a:ext cx="900000" cy="576000"/>
-            <a:chOff x="3300121" y="929898"/>
-            <a:chExt cx="900000" cy="576000"/>
-          </a:xfrm>
-        </p:grpSpPr>
-        <p:sp>
-          <p:nvSpPr>
-            <p:cNvPr id="16" name="Rectangle 15">
-              <a:extLst>
-                <a:ext uri="{FF2B5EF4-FFF2-40B4-BE49-F238E27FC236}">
-                  <a16:creationId xmlns:a16="http://schemas.microsoft.com/office/drawing/2014/main" id="{62B6DCFD-347B-10BA-43F6-D75E8C02AF3E}"/>
-                </a:ext>
-              </a:extLst>
-            </p:cNvPr>
-            <p:cNvSpPr/>
-            <p:nvPr/>
-          </p:nvSpPr>
-          <p:spPr>
-            <a:xfrm>
-              <a:off x="3300121" y="929898"/>
-              <a:ext cx="900000" cy="576000"/>
-            </a:xfrm>
-            <a:prstGeom prst="rect">
-              <a:avLst/>
-            </a:prstGeom>
-            <a:solidFill>
-              <a:schemeClr val="bg1"/>
-            </a:solidFill>
-            <a:ln w="12700">
-              <a:solidFill>
-                <a:schemeClr val="tx1">
-                  <a:lumMod val="65000"/>
-                  <a:lumOff val="35000"/>
-                </a:schemeClr>
-              </a:solidFill>
-            </a:ln>
-          </p:spPr>
-          <p:style>
-            <a:lnRef idx="2">
-              <a:schemeClr val="accent1">
-                <a:shade val="50000"/>
-              </a:schemeClr>
-            </a:lnRef>
-            <a:fillRef idx="1">
-              <a:schemeClr val="accent1"/>
-            </a:fillRef>
-            <a:effectRef idx="0">
-              <a:schemeClr val="accent1"/>
-            </a:effectRef>
-            <a:fontRef idx="minor">
-              <a:schemeClr val="lt1"/>
-            </a:fontRef>
-          </p:style>
-          <p:txBody>
-            <a:bodyPr rtlCol="0" anchor="ctr"/>
-            <a:lstStyle/>
-            <a:p>
-              <a:pPr algn="ctr"/>
-              <a:endParaRPr lang="en-US"/>
-            </a:p>
-          </p:txBody>
-        </p:sp>
-        <p:pic>
-          <p:nvPicPr>
-            <p:cNvPr id="15" name="Graphic 14">
-              <a:extLst>
-                <a:ext uri="{FF2B5EF4-FFF2-40B4-BE49-F238E27FC236}">
-                  <a16:creationId xmlns:a16="http://schemas.microsoft.com/office/drawing/2014/main" id="{1B1AB2ED-EE15-46C3-E6AA-9C05351C3897}"/>
-                </a:ext>
-              </a:extLst>
-            </p:cNvPr>
-            <p:cNvPicPr>
-              <a:picLocks noChangeAspect="1"/>
-            </p:cNvPicPr>
-            <p:nvPr/>
-          </p:nvPicPr>
-          <p:blipFill rotWithShape="1">
-            <a:blip r:embed="rId6">
-              <a:extLst>
-                <a:ext uri="{28A0092B-C50C-407E-A947-70E740481C1C}">
-                  <a14:useLocalDpi xmlns:a14="http://schemas.microsoft.com/office/drawing/2010/main" val="0"/>
-                </a:ext>
-                <a:ext uri="{96DAC541-7B7A-43D3-8B79-37D633B846F1}">
-                  <asvg:svgBlip xmlns:asvg="http://schemas.microsoft.com/office/drawing/2016/SVG/main" r:embed="rId7"/>
-                </a:ext>
-              </a:extLst>
-            </a:blip>
-            <a:srcRect l="-2" r="55033"/>
-            <a:stretch/>
-          </p:blipFill>
-          <p:spPr>
-            <a:xfrm>
-              <a:off x="3380502" y="1002677"/>
-              <a:ext cx="792000" cy="432000"/>
-            </a:xfrm>
-            <a:prstGeom prst="rect">
-              <a:avLst/>
-            </a:prstGeom>
-          </p:spPr>
-        </p:pic>
-      </p:grpSp>
       <p:cxnSp>
         <p:nvCxnSpPr>
           <p:cNvPr id="20" name="Straight Arrow Connector 19">
@@ -3853,7 +3780,7 @@
         </p:nvSpPr>
         <p:spPr>
           <a:xfrm>
-            <a:off x="2924968" y="930616"/>
+            <a:off x="2934907" y="930616"/>
             <a:ext cx="1396216" cy="338554"/>
           </a:xfrm>
           <a:prstGeom prst="rect">
@@ -4224,13 +4151,13 @@
           <p:nvPr/>
         </p:nvPicPr>
         <p:blipFill>
-          <a:blip r:embed="rId8">
+          <a:blip r:embed="rId6">
             <a:extLst>
               <a:ext uri="{28A0092B-C50C-407E-A947-70E740481C1C}">
                 <a14:useLocalDpi xmlns:a14="http://schemas.microsoft.com/office/drawing/2010/main" val="0"/>
               </a:ext>
               <a:ext uri="{96DAC541-7B7A-43D3-8B79-37D633B846F1}">
-                <asvg:svgBlip xmlns:asvg="http://schemas.microsoft.com/office/drawing/2016/SVG/main" r:embed="rId9"/>
+                <asvg:svgBlip xmlns:asvg="http://schemas.microsoft.com/office/drawing/2016/SVG/main" r:embed="rId7"/>
               </a:ext>
             </a:extLst>
           </a:blip>
@@ -6011,475 +5938,12 @@
           </a:p>
         </p:txBody>
       </p:sp>
-    </p:spTree>
-    <p:extLst>
-      <p:ext uri="{BB962C8B-B14F-4D97-AF65-F5344CB8AC3E}">
-        <p14:creationId xmlns:p14="http://schemas.microsoft.com/office/powerpoint/2010/main" val="1474752703"/>
-      </p:ext>
-    </p:extLst>
-  </p:cSld>
-  <p:clrMapOvr>
-    <a:masterClrMapping/>
-  </p:clrMapOvr>
-</p:sld>
-</file>
-
-<file path=ppt/slides/slide2.xml><?xml version="1.0" encoding="utf-8"?>
-<p:sld xmlns:a="http://schemas.openxmlformats.org/drawingml/2006/main" xmlns:r="http://schemas.openxmlformats.org/officeDocument/2006/relationships" xmlns:p="http://schemas.openxmlformats.org/presentationml/2006/main">
-  <p:cSld>
-    <p:spTree>
-      <p:nvGrpSpPr>
-        <p:cNvPr id="1" name=""/>
-        <p:cNvGrpSpPr/>
-        <p:nvPr/>
-      </p:nvGrpSpPr>
-      <p:grpSpPr>
-        <a:xfrm>
-          <a:off x="0" y="0"/>
-          <a:ext cx="0" cy="0"/>
-          <a:chOff x="0" y="0"/>
-          <a:chExt cx="0" cy="0"/>
-        </a:xfrm>
-      </p:grpSpPr>
-      <p:cxnSp>
-        <p:nvCxnSpPr>
-          <p:cNvPr id="60" name="Straight Arrow Connector 59">
-            <a:extLst>
-              <a:ext uri="{FF2B5EF4-FFF2-40B4-BE49-F238E27FC236}">
-                <a16:creationId xmlns:a16="http://schemas.microsoft.com/office/drawing/2014/main" id="{46766D17-A30A-5F57-6CFC-4DC518980C1D}"/>
-              </a:ext>
-            </a:extLst>
-          </p:cNvPr>
-          <p:cNvCxnSpPr/>
-          <p:nvPr/>
-        </p:nvCxnSpPr>
-        <p:spPr>
-          <a:xfrm>
-            <a:off x="7040504" y="1684800"/>
-            <a:ext cx="0" cy="4932000"/>
-          </a:xfrm>
-          <a:prstGeom prst="straightConnector1">
-            <a:avLst/>
-          </a:prstGeom>
-          <a:ln w="15875">
-            <a:solidFill>
-              <a:schemeClr val="accent1"/>
-            </a:solidFill>
-            <a:tailEnd type="triangle"/>
-          </a:ln>
-        </p:spPr>
-        <p:style>
-          <a:lnRef idx="1">
-            <a:schemeClr val="accent1"/>
-          </a:lnRef>
-          <a:fillRef idx="0">
-            <a:schemeClr val="accent1"/>
-          </a:fillRef>
-          <a:effectRef idx="0">
-            <a:schemeClr val="accent1"/>
-          </a:effectRef>
-          <a:fontRef idx="minor">
-            <a:schemeClr val="tx1"/>
-          </a:fontRef>
-        </p:style>
-      </p:cxnSp>
-      <p:cxnSp>
-        <p:nvCxnSpPr>
-          <p:cNvPr id="50" name="Straight Arrow Connector 49">
-            <a:extLst>
-              <a:ext uri="{FF2B5EF4-FFF2-40B4-BE49-F238E27FC236}">
-                <a16:creationId xmlns:a16="http://schemas.microsoft.com/office/drawing/2014/main" id="{4B745F3D-2CEC-C7C5-B37E-D0160C36E138}"/>
-              </a:ext>
-            </a:extLst>
-          </p:cNvPr>
-          <p:cNvCxnSpPr/>
-          <p:nvPr/>
-        </p:nvCxnSpPr>
-        <p:spPr>
-          <a:xfrm>
-            <a:off x="9164159" y="1684800"/>
-            <a:ext cx="0" cy="4932000"/>
-          </a:xfrm>
-          <a:prstGeom prst="straightConnector1">
-            <a:avLst/>
-          </a:prstGeom>
-          <a:ln w="15875">
-            <a:solidFill>
-              <a:schemeClr val="accent1"/>
-            </a:solidFill>
-            <a:tailEnd type="triangle"/>
-          </a:ln>
-        </p:spPr>
-        <p:style>
-          <a:lnRef idx="1">
-            <a:schemeClr val="accent1"/>
-          </a:lnRef>
-          <a:fillRef idx="0">
-            <a:schemeClr val="accent1"/>
-          </a:fillRef>
-          <a:effectRef idx="0">
-            <a:schemeClr val="accent1"/>
-          </a:effectRef>
-          <a:fontRef idx="minor">
-            <a:schemeClr val="tx1"/>
-          </a:fontRef>
-        </p:style>
-      </p:cxnSp>
-      <p:sp>
-        <p:nvSpPr>
-          <p:cNvPr id="14" name="Rectangle 13">
-            <a:extLst>
-              <a:ext uri="{FF2B5EF4-FFF2-40B4-BE49-F238E27FC236}">
-                <a16:creationId xmlns:a16="http://schemas.microsoft.com/office/drawing/2014/main" id="{89A58D7E-CBB1-944C-EE9A-D3029115668A}"/>
-              </a:ext>
-            </a:extLst>
-          </p:cNvPr>
-          <p:cNvSpPr/>
-          <p:nvPr/>
-        </p:nvSpPr>
-        <p:spPr>
-          <a:xfrm>
-            <a:off x="1499519" y="609452"/>
-            <a:ext cx="4155845" cy="1437618"/>
-          </a:xfrm>
-          <a:prstGeom prst="roundRect">
-            <a:avLst>
-              <a:gd name="adj" fmla="val 8007"/>
-            </a:avLst>
-          </a:prstGeom>
-          <a:solidFill>
-            <a:schemeClr val="bg1">
-              <a:lumMod val="95000"/>
-            </a:schemeClr>
-          </a:solidFill>
-          <a:ln w="6350">
-            <a:noFill/>
-            <a:prstDash val="dash"/>
-          </a:ln>
-        </p:spPr>
-        <p:style>
-          <a:lnRef idx="2">
-            <a:schemeClr val="accent1">
-              <a:shade val="50000"/>
-            </a:schemeClr>
-          </a:lnRef>
-          <a:fillRef idx="1">
-            <a:schemeClr val="accent1"/>
-          </a:fillRef>
-          <a:effectRef idx="0">
-            <a:schemeClr val="accent1"/>
-          </a:effectRef>
-          <a:fontRef idx="minor">
-            <a:schemeClr val="lt1"/>
-          </a:fontRef>
-        </p:style>
-        <p:txBody>
-          <a:bodyPr rtlCol="0" anchor="ctr"/>
-          <a:lstStyle/>
-          <a:p>
-            <a:pPr algn="ctr"/>
-            <a:endParaRPr lang="en-US"/>
-          </a:p>
-        </p:txBody>
-      </p:sp>
-      <p:cxnSp>
-        <p:nvCxnSpPr>
-          <p:cNvPr id="41" name="Straight Arrow Connector 40">
-            <a:extLst>
-              <a:ext uri="{FF2B5EF4-FFF2-40B4-BE49-F238E27FC236}">
-                <a16:creationId xmlns:a16="http://schemas.microsoft.com/office/drawing/2014/main" id="{3FB7D3F4-FBFA-5DF0-98C5-9FDC2F064CCA}"/>
-              </a:ext>
-            </a:extLst>
-          </p:cNvPr>
-          <p:cNvCxnSpPr/>
-          <p:nvPr/>
-        </p:nvCxnSpPr>
-        <p:spPr>
-          <a:xfrm>
-            <a:off x="675596" y="1683621"/>
-            <a:ext cx="0" cy="4932000"/>
-          </a:xfrm>
-          <a:prstGeom prst="straightConnector1">
-            <a:avLst/>
-          </a:prstGeom>
-          <a:ln w="15875">
-            <a:solidFill>
-              <a:schemeClr val="accent1"/>
-            </a:solidFill>
-            <a:tailEnd type="triangle"/>
-          </a:ln>
-        </p:spPr>
-        <p:style>
-          <a:lnRef idx="1">
-            <a:schemeClr val="accent1"/>
-          </a:lnRef>
-          <a:fillRef idx="0">
-            <a:schemeClr val="accent1"/>
-          </a:fillRef>
-          <a:effectRef idx="0">
-            <a:schemeClr val="accent1"/>
-          </a:effectRef>
-          <a:fontRef idx="minor">
-            <a:schemeClr val="tx1"/>
-          </a:fontRef>
-        </p:style>
-      </p:cxnSp>
-      <p:cxnSp>
-        <p:nvCxnSpPr>
-          <p:cNvPr id="19" name="Straight Arrow Connector 18">
-            <a:extLst>
-              <a:ext uri="{FF2B5EF4-FFF2-40B4-BE49-F238E27FC236}">
-                <a16:creationId xmlns:a16="http://schemas.microsoft.com/office/drawing/2014/main" id="{10520682-FA1F-234D-594D-2FB20A17A82F}"/>
-              </a:ext>
-            </a:extLst>
-          </p:cNvPr>
-          <p:cNvCxnSpPr/>
-          <p:nvPr/>
-        </p:nvCxnSpPr>
-        <p:spPr>
-          <a:xfrm>
-            <a:off x="3647480" y="1683621"/>
-            <a:ext cx="0" cy="4932000"/>
-          </a:xfrm>
-          <a:prstGeom prst="straightConnector1">
-            <a:avLst/>
-          </a:prstGeom>
-          <a:ln w="15875">
-            <a:solidFill>
-              <a:schemeClr val="accent1"/>
-            </a:solidFill>
-            <a:tailEnd type="triangle"/>
-          </a:ln>
-        </p:spPr>
-        <p:style>
-          <a:lnRef idx="1">
-            <a:schemeClr val="accent1"/>
-          </a:lnRef>
-          <a:fillRef idx="0">
-            <a:schemeClr val="accent1"/>
-          </a:fillRef>
-          <a:effectRef idx="0">
-            <a:schemeClr val="accent1"/>
-          </a:effectRef>
-          <a:fontRef idx="minor">
-            <a:schemeClr val="tx1"/>
-          </a:fontRef>
-        </p:style>
-      </p:cxnSp>
-      <p:sp>
-        <p:nvSpPr>
-          <p:cNvPr id="4" name="TextBox 3">
-            <a:extLst>
-              <a:ext uri="{FF2B5EF4-FFF2-40B4-BE49-F238E27FC236}">
-                <a16:creationId xmlns:a16="http://schemas.microsoft.com/office/drawing/2014/main" id="{E8061992-EA1A-B21C-F268-8EE3B525AF3E}"/>
-              </a:ext>
-            </a:extLst>
-          </p:cNvPr>
-          <p:cNvSpPr txBox="1"/>
-          <p:nvPr/>
-        </p:nvSpPr>
-        <p:spPr>
-          <a:xfrm>
-            <a:off x="2619734" y="90559"/>
-            <a:ext cx="6952544" cy="369332"/>
-          </a:xfrm>
-          <a:prstGeom prst="rect">
-            <a:avLst/>
-          </a:prstGeom>
-          <a:noFill/>
-        </p:spPr>
-        <p:txBody>
-          <a:bodyPr wrap="none" rtlCol="0">
-            <a:spAutoFit/>
-          </a:bodyPr>
-          <a:lstStyle/>
-          <a:p>
-            <a:pPr algn="ctr"/>
-            <a:r>
-              <a:rPr lang="en-US" dirty="0">
-                <a:latin typeface="Roboto Medium" panose="02000000000000000000" pitchFamily="2" charset="0"/>
-                <a:ea typeface="Roboto Medium" panose="02000000000000000000" pitchFamily="2" charset="0"/>
-              </a:rPr>
-              <a:t>Combining FIDO2®/CTAP2 with a Wallet – </a:t>
-            </a:r>
-            <a:r>
-              <a:rPr lang="en-US" i="1" dirty="0">
-                <a:latin typeface="Roboto Medium" panose="02000000000000000000" pitchFamily="2" charset="0"/>
-                <a:ea typeface="Roboto Medium" panose="02000000000000000000" pitchFamily="2" charset="0"/>
-              </a:rPr>
-              <a:t>Payment Authorization</a:t>
-            </a:r>
-          </a:p>
-        </p:txBody>
-      </p:sp>
-      <p:cxnSp>
-        <p:nvCxnSpPr>
-          <p:cNvPr id="6" name="Straight Arrow Connector 5">
-            <a:extLst>
-              <a:ext uri="{FF2B5EF4-FFF2-40B4-BE49-F238E27FC236}">
-                <a16:creationId xmlns:a16="http://schemas.microsoft.com/office/drawing/2014/main" id="{5C7E2C93-FFDE-A9E8-E6A2-3BB871CD4445}"/>
-              </a:ext>
-            </a:extLst>
-          </p:cNvPr>
-          <p:cNvCxnSpPr/>
-          <p:nvPr/>
-        </p:nvCxnSpPr>
-        <p:spPr>
-          <a:xfrm>
-            <a:off x="5133423" y="1683621"/>
-            <a:ext cx="0" cy="4932000"/>
-          </a:xfrm>
-          <a:prstGeom prst="straightConnector1">
-            <a:avLst/>
-          </a:prstGeom>
-          <a:ln w="15875">
-            <a:solidFill>
-              <a:schemeClr val="accent1"/>
-            </a:solidFill>
-            <a:tailEnd type="triangle"/>
-          </a:ln>
-        </p:spPr>
-        <p:style>
-          <a:lnRef idx="1">
-            <a:schemeClr val="accent1"/>
-          </a:lnRef>
-          <a:fillRef idx="0">
-            <a:schemeClr val="accent1"/>
-          </a:fillRef>
-          <a:effectRef idx="0">
-            <a:schemeClr val="accent1"/>
-          </a:effectRef>
-          <a:fontRef idx="minor">
-            <a:schemeClr val="tx1"/>
-          </a:fontRef>
-        </p:style>
-      </p:cxnSp>
-      <p:cxnSp>
-        <p:nvCxnSpPr>
-          <p:cNvPr id="7" name="Straight Arrow Connector 6">
-            <a:extLst>
-              <a:ext uri="{FF2B5EF4-FFF2-40B4-BE49-F238E27FC236}">
-                <a16:creationId xmlns:a16="http://schemas.microsoft.com/office/drawing/2014/main" id="{9DAAB30E-3765-D086-E26E-C95B7B48880A}"/>
-              </a:ext>
-            </a:extLst>
-          </p:cNvPr>
-          <p:cNvCxnSpPr/>
-          <p:nvPr/>
-        </p:nvCxnSpPr>
-        <p:spPr>
-          <a:xfrm>
-            <a:off x="10850497" y="1684800"/>
-            <a:ext cx="0" cy="4932000"/>
-          </a:xfrm>
-          <a:prstGeom prst="straightConnector1">
-            <a:avLst/>
-          </a:prstGeom>
-          <a:ln w="15875">
-            <a:solidFill>
-              <a:schemeClr val="accent1"/>
-            </a:solidFill>
-            <a:tailEnd type="triangle"/>
-          </a:ln>
-        </p:spPr>
-        <p:style>
-          <a:lnRef idx="1">
-            <a:schemeClr val="accent1"/>
-          </a:lnRef>
-          <a:fillRef idx="0">
-            <a:schemeClr val="accent1"/>
-          </a:fillRef>
-          <a:effectRef idx="0">
-            <a:schemeClr val="accent1"/>
-          </a:effectRef>
-          <a:fontRef idx="minor">
-            <a:schemeClr val="tx1"/>
-          </a:fontRef>
-        </p:style>
-      </p:cxnSp>
-      <p:pic>
-        <p:nvPicPr>
-          <p:cNvPr id="9" name="Graphic 8">
-            <a:extLst>
-              <a:ext uri="{FF2B5EF4-FFF2-40B4-BE49-F238E27FC236}">
-                <a16:creationId xmlns:a16="http://schemas.microsoft.com/office/drawing/2014/main" id="{02ECF766-AD58-E447-6236-0A23F4B8135A}"/>
-              </a:ext>
-            </a:extLst>
-          </p:cNvPr>
-          <p:cNvPicPr>
-            <a:picLocks noChangeAspect="1"/>
-          </p:cNvPicPr>
-          <p:nvPr/>
-        </p:nvPicPr>
-        <p:blipFill>
-          <a:blip r:embed="rId2">
-            <a:extLst>
-              <a:ext uri="{28A0092B-C50C-407E-A947-70E740481C1C}">
-                <a14:useLocalDpi xmlns:a14="http://schemas.microsoft.com/office/drawing/2010/main" val="0"/>
-              </a:ext>
-              <a:ext uri="{96DAC541-7B7A-43D3-8B79-37D633B846F1}">
-                <asvg:svgBlip xmlns:asvg="http://schemas.microsoft.com/office/drawing/2016/SVG/main" r:embed="rId3"/>
-              </a:ext>
-            </a:extLst>
-          </a:blip>
-          <a:stretch>
-            <a:fillRect/>
-          </a:stretch>
-        </p:blipFill>
-        <p:spPr>
-          <a:xfrm>
-            <a:off x="4820116" y="1295514"/>
-            <a:ext cx="612000" cy="612000"/>
-          </a:xfrm>
-          <a:prstGeom prst="rect">
-            <a:avLst/>
-          </a:prstGeom>
-        </p:spPr>
-      </p:pic>
-      <p:pic>
-        <p:nvPicPr>
-          <p:cNvPr id="11" name="Graphic 10">
-            <a:extLst>
-              <a:ext uri="{FF2B5EF4-FFF2-40B4-BE49-F238E27FC236}">
-                <a16:creationId xmlns:a16="http://schemas.microsoft.com/office/drawing/2014/main" id="{C165F298-CE7D-25D6-4946-BE7C50FA8F62}"/>
-              </a:ext>
-            </a:extLst>
-          </p:cNvPr>
-          <p:cNvPicPr>
-            <a:picLocks noChangeAspect="1"/>
-          </p:cNvPicPr>
-          <p:nvPr/>
-        </p:nvPicPr>
-        <p:blipFill>
-          <a:blip r:embed="rId4">
-            <a:extLst>
-              <a:ext uri="{28A0092B-C50C-407E-A947-70E740481C1C}">
-                <a14:useLocalDpi xmlns:a14="http://schemas.microsoft.com/office/drawing/2010/main" val="0"/>
-              </a:ext>
-              <a:ext uri="{96DAC541-7B7A-43D3-8B79-37D633B846F1}">
-                <asvg:svgBlip xmlns:asvg="http://schemas.microsoft.com/office/drawing/2016/SVG/main" r:embed="rId5"/>
-              </a:ext>
-            </a:extLst>
-          </a:blip>
-          <a:stretch>
-            <a:fillRect/>
-          </a:stretch>
-        </p:blipFill>
-        <p:spPr>
-          <a:xfrm>
-            <a:off x="10326619" y="1317519"/>
-            <a:ext cx="1047750" cy="685800"/>
-          </a:xfrm>
-          <a:prstGeom prst="rect">
-            <a:avLst/>
-          </a:prstGeom>
-        </p:spPr>
-      </p:pic>
       <p:grpSp>
         <p:nvGrpSpPr>
-          <p:cNvPr id="43" name="Group 42">
-            <a:extLst>
-              <a:ext uri="{FF2B5EF4-FFF2-40B4-BE49-F238E27FC236}">
-                <a16:creationId xmlns:a16="http://schemas.microsoft.com/office/drawing/2014/main" id="{25FAD7CA-7106-CECD-BE3B-8933EDA04D97}"/>
+          <p:cNvPr id="60" name="Group 59">
+            <a:extLst>
+              <a:ext uri="{FF2B5EF4-FFF2-40B4-BE49-F238E27FC236}">
+                <a16:creationId xmlns:a16="http://schemas.microsoft.com/office/drawing/2014/main" id="{DE03DE5D-0FE4-254E-58ED-A9E26BDB97C5}"/>
               </a:ext>
             </a:extLst>
           </p:cNvPr>
@@ -6488,10 +5952,10 @@
         </p:nvGrpSpPr>
         <p:grpSpPr>
           <a:xfrm>
-            <a:off x="3189170" y="1307580"/>
-            <a:ext cx="900000" cy="576000"/>
-            <a:chOff x="3300121" y="929898"/>
-            <a:chExt cx="900000" cy="576000"/>
+            <a:off x="3072521" y="1307580"/>
+            <a:ext cx="1142351" cy="576000"/>
+            <a:chOff x="3072521" y="1307580"/>
+            <a:chExt cx="1142351" cy="576000"/>
           </a:xfrm>
         </p:grpSpPr>
         <p:sp>
@@ -6508,8 +5972,8 @@
           </p:nvSpPr>
           <p:spPr>
             <a:xfrm>
-              <a:off x="3300121" y="929898"/>
-              <a:ext cx="900000" cy="576000"/>
+              <a:off x="3072521" y="1307580"/>
+              <a:ext cx="1142351" cy="576000"/>
             </a:xfrm>
             <a:prstGeom prst="rect">
               <a:avLst/>
@@ -6553,10 +6017,10 @@
         </p:sp>
         <p:pic>
           <p:nvPicPr>
-            <p:cNvPr id="15" name="Graphic 14">
+            <p:cNvPr id="50" name="Graphic 49">
               <a:extLst>
                 <a:ext uri="{FF2B5EF4-FFF2-40B4-BE49-F238E27FC236}">
-                  <a16:creationId xmlns:a16="http://schemas.microsoft.com/office/drawing/2014/main" id="{1B1AB2ED-EE15-46C3-E6AA-9C05351C3897}"/>
+                  <a16:creationId xmlns:a16="http://schemas.microsoft.com/office/drawing/2014/main" id="{0B35DB23-2D14-6B35-1BC9-2449952CB30A}"/>
                 </a:ext>
               </a:extLst>
             </p:cNvPr>
@@ -6565,24 +6029,25 @@
             </p:cNvPicPr>
             <p:nvPr/>
           </p:nvPicPr>
-          <p:blipFill rotWithShape="1">
-            <a:blip r:embed="rId6">
+          <p:blipFill>
+            <a:blip r:embed="rId8">
               <a:extLst>
                 <a:ext uri="{28A0092B-C50C-407E-A947-70E740481C1C}">
                   <a14:useLocalDpi xmlns:a14="http://schemas.microsoft.com/office/drawing/2010/main" val="0"/>
                 </a:ext>
                 <a:ext uri="{96DAC541-7B7A-43D3-8B79-37D633B846F1}">
-                  <asvg:svgBlip xmlns:asvg="http://schemas.microsoft.com/office/drawing/2016/SVG/main" r:embed="rId7"/>
+                  <asvg:svgBlip xmlns:asvg="http://schemas.microsoft.com/office/drawing/2016/SVG/main" r:embed="rId9"/>
                 </a:ext>
               </a:extLst>
             </a:blip>
-            <a:srcRect l="-2" r="55033"/>
-            <a:stretch/>
+            <a:stretch>
+              <a:fillRect/>
+            </a:stretch>
           </p:blipFill>
           <p:spPr>
             <a:xfrm>
-              <a:off x="3380502" y="1002677"/>
-              <a:ext cx="792000" cy="432000"/>
+              <a:off x="3170200" y="1396671"/>
+              <a:ext cx="970321" cy="397330"/>
             </a:xfrm>
             <a:prstGeom prst="rect">
               <a:avLst/>
@@ -6590,12 +6055,42 @@
           </p:spPr>
         </p:pic>
       </p:grpSp>
+    </p:spTree>
+    <p:extLst>
+      <p:ext uri="{BB962C8B-B14F-4D97-AF65-F5344CB8AC3E}">
+        <p14:creationId xmlns:p14="http://schemas.microsoft.com/office/powerpoint/2010/main" val="1474752703"/>
+      </p:ext>
+    </p:extLst>
+  </p:cSld>
+  <p:clrMapOvr>
+    <a:masterClrMapping/>
+  </p:clrMapOvr>
+</p:sld>
+</file>
+
+<file path=ppt/slides/slide2.xml><?xml version="1.0" encoding="utf-8"?>
+<p:sld xmlns:a="http://schemas.openxmlformats.org/drawingml/2006/main" xmlns:r="http://schemas.openxmlformats.org/officeDocument/2006/relationships" xmlns:p="http://schemas.openxmlformats.org/presentationml/2006/main">
+  <p:cSld>
+    <p:spTree>
+      <p:nvGrpSpPr>
+        <p:cNvPr id="1" name=""/>
+        <p:cNvGrpSpPr/>
+        <p:nvPr/>
+      </p:nvGrpSpPr>
+      <p:grpSpPr>
+        <a:xfrm>
+          <a:off x="0" y="0"/>
+          <a:ext cx="0" cy="0"/>
+          <a:chOff x="0" y="0"/>
+          <a:chExt cx="0" cy="0"/>
+        </a:xfrm>
+      </p:grpSpPr>
       <p:cxnSp>
         <p:nvCxnSpPr>
-          <p:cNvPr id="20" name="Straight Arrow Connector 19">
-            <a:extLst>
-              <a:ext uri="{FF2B5EF4-FFF2-40B4-BE49-F238E27FC236}">
-                <a16:creationId xmlns:a16="http://schemas.microsoft.com/office/drawing/2014/main" id="{14C1E269-9863-3B12-7821-342484131663}"/>
+          <p:cNvPr id="60" name="Straight Arrow Connector 59">
+            <a:extLst>
+              <a:ext uri="{FF2B5EF4-FFF2-40B4-BE49-F238E27FC236}">
+                <a16:creationId xmlns:a16="http://schemas.microsoft.com/office/drawing/2014/main" id="{46766D17-A30A-5F57-6CFC-4DC518980C1D}"/>
               </a:ext>
             </a:extLst>
           </p:cNvPr>
@@ -6604,7 +6099,7 @@
         </p:nvCxnSpPr>
         <p:spPr>
           <a:xfrm>
-            <a:off x="2161538" y="1683621"/>
+            <a:off x="7040504" y="1684800"/>
             <a:ext cx="0" cy="4932000"/>
           </a:xfrm>
           <a:prstGeom prst="straightConnector1">
@@ -6632,12 +6127,195 @@
           </a:fontRef>
         </p:style>
       </p:cxnSp>
-      <p:sp>
-        <p:nvSpPr>
-          <p:cNvPr id="21" name="TextBox 20">
-            <a:extLst>
-              <a:ext uri="{FF2B5EF4-FFF2-40B4-BE49-F238E27FC236}">
-                <a16:creationId xmlns:a16="http://schemas.microsoft.com/office/drawing/2014/main" id="{3B5CAE2D-A63F-1D56-04E3-116ED6FA3AE8}"/>
+      <p:cxnSp>
+        <p:nvCxnSpPr>
+          <p:cNvPr id="50" name="Straight Arrow Connector 49">
+            <a:extLst>
+              <a:ext uri="{FF2B5EF4-FFF2-40B4-BE49-F238E27FC236}">
+                <a16:creationId xmlns:a16="http://schemas.microsoft.com/office/drawing/2014/main" id="{4B745F3D-2CEC-C7C5-B37E-D0160C36E138}"/>
+              </a:ext>
+            </a:extLst>
+          </p:cNvPr>
+          <p:cNvCxnSpPr/>
+          <p:nvPr/>
+        </p:nvCxnSpPr>
+        <p:spPr>
+          <a:xfrm>
+            <a:off x="9164159" y="1684800"/>
+            <a:ext cx="0" cy="4932000"/>
+          </a:xfrm>
+          <a:prstGeom prst="straightConnector1">
+            <a:avLst/>
+          </a:prstGeom>
+          <a:ln w="15875">
+            <a:solidFill>
+              <a:schemeClr val="accent1"/>
+            </a:solidFill>
+            <a:tailEnd type="triangle"/>
+          </a:ln>
+        </p:spPr>
+        <p:style>
+          <a:lnRef idx="1">
+            <a:schemeClr val="accent1"/>
+          </a:lnRef>
+          <a:fillRef idx="0">
+            <a:schemeClr val="accent1"/>
+          </a:fillRef>
+          <a:effectRef idx="0">
+            <a:schemeClr val="accent1"/>
+          </a:effectRef>
+          <a:fontRef idx="minor">
+            <a:schemeClr val="tx1"/>
+          </a:fontRef>
+        </p:style>
+      </p:cxnSp>
+      <p:sp>
+        <p:nvSpPr>
+          <p:cNvPr id="14" name="Rectangle 13">
+            <a:extLst>
+              <a:ext uri="{FF2B5EF4-FFF2-40B4-BE49-F238E27FC236}">
+                <a16:creationId xmlns:a16="http://schemas.microsoft.com/office/drawing/2014/main" id="{89A58D7E-CBB1-944C-EE9A-D3029115668A}"/>
+              </a:ext>
+            </a:extLst>
+          </p:cNvPr>
+          <p:cNvSpPr/>
+          <p:nvPr/>
+        </p:nvSpPr>
+        <p:spPr>
+          <a:xfrm>
+            <a:off x="1499519" y="609452"/>
+            <a:ext cx="4155845" cy="1437618"/>
+          </a:xfrm>
+          <a:prstGeom prst="roundRect">
+            <a:avLst>
+              <a:gd name="adj" fmla="val 8007"/>
+            </a:avLst>
+          </a:prstGeom>
+          <a:solidFill>
+            <a:schemeClr val="bg1">
+              <a:lumMod val="95000"/>
+            </a:schemeClr>
+          </a:solidFill>
+          <a:ln w="6350">
+            <a:noFill/>
+            <a:prstDash val="dash"/>
+          </a:ln>
+        </p:spPr>
+        <p:style>
+          <a:lnRef idx="2">
+            <a:schemeClr val="accent1">
+              <a:shade val="50000"/>
+            </a:schemeClr>
+          </a:lnRef>
+          <a:fillRef idx="1">
+            <a:schemeClr val="accent1"/>
+          </a:fillRef>
+          <a:effectRef idx="0">
+            <a:schemeClr val="accent1"/>
+          </a:effectRef>
+          <a:fontRef idx="minor">
+            <a:schemeClr val="lt1"/>
+          </a:fontRef>
+        </p:style>
+        <p:txBody>
+          <a:bodyPr rtlCol="0" anchor="ctr"/>
+          <a:lstStyle/>
+          <a:p>
+            <a:pPr algn="ctr"/>
+            <a:endParaRPr lang="en-US"/>
+          </a:p>
+        </p:txBody>
+      </p:sp>
+      <p:cxnSp>
+        <p:nvCxnSpPr>
+          <p:cNvPr id="41" name="Straight Arrow Connector 40">
+            <a:extLst>
+              <a:ext uri="{FF2B5EF4-FFF2-40B4-BE49-F238E27FC236}">
+                <a16:creationId xmlns:a16="http://schemas.microsoft.com/office/drawing/2014/main" id="{3FB7D3F4-FBFA-5DF0-98C5-9FDC2F064CCA}"/>
+              </a:ext>
+            </a:extLst>
+          </p:cNvPr>
+          <p:cNvCxnSpPr/>
+          <p:nvPr/>
+        </p:nvCxnSpPr>
+        <p:spPr>
+          <a:xfrm>
+            <a:off x="675596" y="1683621"/>
+            <a:ext cx="0" cy="4932000"/>
+          </a:xfrm>
+          <a:prstGeom prst="straightConnector1">
+            <a:avLst/>
+          </a:prstGeom>
+          <a:ln w="15875">
+            <a:solidFill>
+              <a:schemeClr val="accent1"/>
+            </a:solidFill>
+            <a:tailEnd type="triangle"/>
+          </a:ln>
+        </p:spPr>
+        <p:style>
+          <a:lnRef idx="1">
+            <a:schemeClr val="accent1"/>
+          </a:lnRef>
+          <a:fillRef idx="0">
+            <a:schemeClr val="accent1"/>
+          </a:fillRef>
+          <a:effectRef idx="0">
+            <a:schemeClr val="accent1"/>
+          </a:effectRef>
+          <a:fontRef idx="minor">
+            <a:schemeClr val="tx1"/>
+          </a:fontRef>
+        </p:style>
+      </p:cxnSp>
+      <p:cxnSp>
+        <p:nvCxnSpPr>
+          <p:cNvPr id="19" name="Straight Arrow Connector 18">
+            <a:extLst>
+              <a:ext uri="{FF2B5EF4-FFF2-40B4-BE49-F238E27FC236}">
+                <a16:creationId xmlns:a16="http://schemas.microsoft.com/office/drawing/2014/main" id="{10520682-FA1F-234D-594D-2FB20A17A82F}"/>
+              </a:ext>
+            </a:extLst>
+          </p:cNvPr>
+          <p:cNvCxnSpPr/>
+          <p:nvPr/>
+        </p:nvCxnSpPr>
+        <p:spPr>
+          <a:xfrm>
+            <a:off x="3647480" y="1683621"/>
+            <a:ext cx="0" cy="4932000"/>
+          </a:xfrm>
+          <a:prstGeom prst="straightConnector1">
+            <a:avLst/>
+          </a:prstGeom>
+          <a:ln w="15875">
+            <a:solidFill>
+              <a:schemeClr val="accent1"/>
+            </a:solidFill>
+            <a:tailEnd type="triangle"/>
+          </a:ln>
+        </p:spPr>
+        <p:style>
+          <a:lnRef idx="1">
+            <a:schemeClr val="accent1"/>
+          </a:lnRef>
+          <a:fillRef idx="0">
+            <a:schemeClr val="accent1"/>
+          </a:fillRef>
+          <a:effectRef idx="0">
+            <a:schemeClr val="accent1"/>
+          </a:effectRef>
+          <a:fontRef idx="minor">
+            <a:schemeClr val="tx1"/>
+          </a:fontRef>
+        </p:style>
+      </p:cxnSp>
+      <p:sp>
+        <p:nvSpPr>
+          <p:cNvPr id="4" name="TextBox 3">
+            <a:extLst>
+              <a:ext uri="{FF2B5EF4-FFF2-40B4-BE49-F238E27FC236}">
+                <a16:creationId xmlns:a16="http://schemas.microsoft.com/office/drawing/2014/main" id="{E8061992-EA1A-B21C-F268-8EE3B525AF3E}"/>
               </a:ext>
             </a:extLst>
           </p:cNvPr>
@@ -6646,8 +6324,8 @@
         </p:nvSpPr>
         <p:spPr>
           <a:xfrm>
-            <a:off x="4684492" y="930616"/>
-            <a:ext cx="874407" cy="338554"/>
+            <a:off x="2619734" y="90559"/>
+            <a:ext cx="6952544" cy="369332"/>
           </a:xfrm>
           <a:prstGeom prst="rect">
             <a:avLst/>
@@ -6662,6 +6340,256 @@
           <a:p>
             <a:pPr algn="ctr"/>
             <a:r>
+              <a:rPr lang="en-US" dirty="0">
+                <a:latin typeface="Roboto Medium" panose="02000000000000000000" pitchFamily="2" charset="0"/>
+                <a:ea typeface="Roboto Medium" panose="02000000000000000000" pitchFamily="2" charset="0"/>
+              </a:rPr>
+              <a:t>Combining FIDO2®/CTAP2 with a Wallet – </a:t>
+            </a:r>
+            <a:r>
+              <a:rPr lang="en-US" i="1" dirty="0">
+                <a:latin typeface="Roboto Medium" panose="02000000000000000000" pitchFamily="2" charset="0"/>
+                <a:ea typeface="Roboto Medium" panose="02000000000000000000" pitchFamily="2" charset="0"/>
+              </a:rPr>
+              <a:t>Payment Authorization</a:t>
+            </a:r>
+          </a:p>
+        </p:txBody>
+      </p:sp>
+      <p:cxnSp>
+        <p:nvCxnSpPr>
+          <p:cNvPr id="6" name="Straight Arrow Connector 5">
+            <a:extLst>
+              <a:ext uri="{FF2B5EF4-FFF2-40B4-BE49-F238E27FC236}">
+                <a16:creationId xmlns:a16="http://schemas.microsoft.com/office/drawing/2014/main" id="{5C7E2C93-FFDE-A9E8-E6A2-3BB871CD4445}"/>
+              </a:ext>
+            </a:extLst>
+          </p:cNvPr>
+          <p:cNvCxnSpPr/>
+          <p:nvPr/>
+        </p:nvCxnSpPr>
+        <p:spPr>
+          <a:xfrm>
+            <a:off x="5133423" y="1683621"/>
+            <a:ext cx="0" cy="4932000"/>
+          </a:xfrm>
+          <a:prstGeom prst="straightConnector1">
+            <a:avLst/>
+          </a:prstGeom>
+          <a:ln w="15875">
+            <a:solidFill>
+              <a:schemeClr val="accent1"/>
+            </a:solidFill>
+            <a:tailEnd type="triangle"/>
+          </a:ln>
+        </p:spPr>
+        <p:style>
+          <a:lnRef idx="1">
+            <a:schemeClr val="accent1"/>
+          </a:lnRef>
+          <a:fillRef idx="0">
+            <a:schemeClr val="accent1"/>
+          </a:fillRef>
+          <a:effectRef idx="0">
+            <a:schemeClr val="accent1"/>
+          </a:effectRef>
+          <a:fontRef idx="minor">
+            <a:schemeClr val="tx1"/>
+          </a:fontRef>
+        </p:style>
+      </p:cxnSp>
+      <p:cxnSp>
+        <p:nvCxnSpPr>
+          <p:cNvPr id="7" name="Straight Arrow Connector 6">
+            <a:extLst>
+              <a:ext uri="{FF2B5EF4-FFF2-40B4-BE49-F238E27FC236}">
+                <a16:creationId xmlns:a16="http://schemas.microsoft.com/office/drawing/2014/main" id="{9DAAB30E-3765-D086-E26E-C95B7B48880A}"/>
+              </a:ext>
+            </a:extLst>
+          </p:cNvPr>
+          <p:cNvCxnSpPr/>
+          <p:nvPr/>
+        </p:nvCxnSpPr>
+        <p:spPr>
+          <a:xfrm>
+            <a:off x="10850497" y="1684800"/>
+            <a:ext cx="0" cy="4932000"/>
+          </a:xfrm>
+          <a:prstGeom prst="straightConnector1">
+            <a:avLst/>
+          </a:prstGeom>
+          <a:ln w="15875">
+            <a:solidFill>
+              <a:schemeClr val="accent1"/>
+            </a:solidFill>
+            <a:tailEnd type="triangle"/>
+          </a:ln>
+        </p:spPr>
+        <p:style>
+          <a:lnRef idx="1">
+            <a:schemeClr val="accent1"/>
+          </a:lnRef>
+          <a:fillRef idx="0">
+            <a:schemeClr val="accent1"/>
+          </a:fillRef>
+          <a:effectRef idx="0">
+            <a:schemeClr val="accent1"/>
+          </a:effectRef>
+          <a:fontRef idx="minor">
+            <a:schemeClr val="tx1"/>
+          </a:fontRef>
+        </p:style>
+      </p:cxnSp>
+      <p:pic>
+        <p:nvPicPr>
+          <p:cNvPr id="9" name="Graphic 8">
+            <a:extLst>
+              <a:ext uri="{FF2B5EF4-FFF2-40B4-BE49-F238E27FC236}">
+                <a16:creationId xmlns:a16="http://schemas.microsoft.com/office/drawing/2014/main" id="{02ECF766-AD58-E447-6236-0A23F4B8135A}"/>
+              </a:ext>
+            </a:extLst>
+          </p:cNvPr>
+          <p:cNvPicPr>
+            <a:picLocks noChangeAspect="1"/>
+          </p:cNvPicPr>
+          <p:nvPr/>
+        </p:nvPicPr>
+        <p:blipFill>
+          <a:blip r:embed="rId2">
+            <a:extLst>
+              <a:ext uri="{28A0092B-C50C-407E-A947-70E740481C1C}">
+                <a14:useLocalDpi xmlns:a14="http://schemas.microsoft.com/office/drawing/2010/main" val="0"/>
+              </a:ext>
+              <a:ext uri="{96DAC541-7B7A-43D3-8B79-37D633B846F1}">
+                <asvg:svgBlip xmlns:asvg="http://schemas.microsoft.com/office/drawing/2016/SVG/main" r:embed="rId3"/>
+              </a:ext>
+            </a:extLst>
+          </a:blip>
+          <a:stretch>
+            <a:fillRect/>
+          </a:stretch>
+        </p:blipFill>
+        <p:spPr>
+          <a:xfrm>
+            <a:off x="4820116" y="1295514"/>
+            <a:ext cx="612000" cy="612000"/>
+          </a:xfrm>
+          <a:prstGeom prst="rect">
+            <a:avLst/>
+          </a:prstGeom>
+        </p:spPr>
+      </p:pic>
+      <p:pic>
+        <p:nvPicPr>
+          <p:cNvPr id="11" name="Graphic 10">
+            <a:extLst>
+              <a:ext uri="{FF2B5EF4-FFF2-40B4-BE49-F238E27FC236}">
+                <a16:creationId xmlns:a16="http://schemas.microsoft.com/office/drawing/2014/main" id="{C165F298-CE7D-25D6-4946-BE7C50FA8F62}"/>
+              </a:ext>
+            </a:extLst>
+          </p:cNvPr>
+          <p:cNvPicPr>
+            <a:picLocks noChangeAspect="1"/>
+          </p:cNvPicPr>
+          <p:nvPr/>
+        </p:nvPicPr>
+        <p:blipFill>
+          <a:blip r:embed="rId4">
+            <a:extLst>
+              <a:ext uri="{28A0092B-C50C-407E-A947-70E740481C1C}">
+                <a14:useLocalDpi xmlns:a14="http://schemas.microsoft.com/office/drawing/2010/main" val="0"/>
+              </a:ext>
+              <a:ext uri="{96DAC541-7B7A-43D3-8B79-37D633B846F1}">
+                <asvg:svgBlip xmlns:asvg="http://schemas.microsoft.com/office/drawing/2016/SVG/main" r:embed="rId5"/>
+              </a:ext>
+            </a:extLst>
+          </a:blip>
+          <a:stretch>
+            <a:fillRect/>
+          </a:stretch>
+        </p:blipFill>
+        <p:spPr>
+          <a:xfrm>
+            <a:off x="10326619" y="1317519"/>
+            <a:ext cx="1047750" cy="685800"/>
+          </a:xfrm>
+          <a:prstGeom prst="rect">
+            <a:avLst/>
+          </a:prstGeom>
+        </p:spPr>
+      </p:pic>
+      <p:cxnSp>
+        <p:nvCxnSpPr>
+          <p:cNvPr id="20" name="Straight Arrow Connector 19">
+            <a:extLst>
+              <a:ext uri="{FF2B5EF4-FFF2-40B4-BE49-F238E27FC236}">
+                <a16:creationId xmlns:a16="http://schemas.microsoft.com/office/drawing/2014/main" id="{14C1E269-9863-3B12-7821-342484131663}"/>
+              </a:ext>
+            </a:extLst>
+          </p:cNvPr>
+          <p:cNvCxnSpPr/>
+          <p:nvPr/>
+        </p:nvCxnSpPr>
+        <p:spPr>
+          <a:xfrm>
+            <a:off x="2161538" y="1683621"/>
+            <a:ext cx="0" cy="4932000"/>
+          </a:xfrm>
+          <a:prstGeom prst="straightConnector1">
+            <a:avLst/>
+          </a:prstGeom>
+          <a:ln w="15875">
+            <a:solidFill>
+              <a:schemeClr val="accent1"/>
+            </a:solidFill>
+            <a:tailEnd type="triangle"/>
+          </a:ln>
+        </p:spPr>
+        <p:style>
+          <a:lnRef idx="1">
+            <a:schemeClr val="accent1"/>
+          </a:lnRef>
+          <a:fillRef idx="0">
+            <a:schemeClr val="accent1"/>
+          </a:fillRef>
+          <a:effectRef idx="0">
+            <a:schemeClr val="accent1"/>
+          </a:effectRef>
+          <a:fontRef idx="minor">
+            <a:schemeClr val="tx1"/>
+          </a:fontRef>
+        </p:style>
+      </p:cxnSp>
+      <p:sp>
+        <p:nvSpPr>
+          <p:cNvPr id="21" name="TextBox 20">
+            <a:extLst>
+              <a:ext uri="{FF2B5EF4-FFF2-40B4-BE49-F238E27FC236}">
+                <a16:creationId xmlns:a16="http://schemas.microsoft.com/office/drawing/2014/main" id="{3B5CAE2D-A63F-1D56-04E3-116ED6FA3AE8}"/>
+              </a:ext>
+            </a:extLst>
+          </p:cNvPr>
+          <p:cNvSpPr txBox="1"/>
+          <p:nvPr/>
+        </p:nvSpPr>
+        <p:spPr>
+          <a:xfrm>
+            <a:off x="4684492" y="930616"/>
+            <a:ext cx="874407" cy="338554"/>
+          </a:xfrm>
+          <a:prstGeom prst="rect">
+            <a:avLst/>
+          </a:prstGeom>
+          <a:noFill/>
+        </p:spPr>
+        <p:txBody>
+          <a:bodyPr wrap="none" rtlCol="0">
+            <a:spAutoFit/>
+          </a:bodyPr>
+          <a:lstStyle/>
+          <a:p>
+            <a:pPr algn="ctr"/>
+            <a:r>
               <a:rPr lang="en-US" sz="1600" dirty="0"/>
               <a:t>Browser</a:t>
             </a:r>
@@ -6682,7 +6610,7 @@
         </p:nvSpPr>
         <p:spPr>
           <a:xfrm>
-            <a:off x="2924968" y="930616"/>
+            <a:off x="2934907" y="930616"/>
             <a:ext cx="1396216" cy="338554"/>
           </a:xfrm>
           <a:prstGeom prst="rect">
@@ -7053,13 +6981,13 @@
           <p:nvPr/>
         </p:nvPicPr>
         <p:blipFill>
-          <a:blip r:embed="rId8">
+          <a:blip r:embed="rId6">
             <a:extLst>
               <a:ext uri="{28A0092B-C50C-407E-A947-70E740481C1C}">
                 <a14:useLocalDpi xmlns:a14="http://schemas.microsoft.com/office/drawing/2010/main" val="0"/>
               </a:ext>
               <a:ext uri="{96DAC541-7B7A-43D3-8B79-37D633B846F1}">
-                <asvg:svgBlip xmlns:asvg="http://schemas.microsoft.com/office/drawing/2016/SVG/main" r:embed="rId9"/>
+                <asvg:svgBlip xmlns:asvg="http://schemas.microsoft.com/office/drawing/2016/SVG/main" r:embed="rId7"/>
               </a:ext>
             </a:extLst>
           </a:blip>
@@ -7598,13 +7526,13 @@
           <p:nvPr/>
         </p:nvPicPr>
         <p:blipFill>
-          <a:blip r:embed="rId10">
+          <a:blip r:embed="rId8">
             <a:extLst>
               <a:ext uri="{28A0092B-C50C-407E-A947-70E740481C1C}">
                 <a14:useLocalDpi xmlns:a14="http://schemas.microsoft.com/office/drawing/2010/main" val="0"/>
               </a:ext>
               <a:ext uri="{96DAC541-7B7A-43D3-8B79-37D633B846F1}">
-                <asvg:svgBlip xmlns:asvg="http://schemas.microsoft.com/office/drawing/2016/SVG/main" r:embed="rId11"/>
+                <asvg:svgBlip xmlns:asvg="http://schemas.microsoft.com/office/drawing/2016/SVG/main" r:embed="rId9"/>
               </a:ext>
             </a:extLst>
           </a:blip>
@@ -7637,13 +7565,13 @@
           <p:nvPr/>
         </p:nvPicPr>
         <p:blipFill>
-          <a:blip r:embed="rId12">
+          <a:blip r:embed="rId10">
             <a:extLst>
               <a:ext uri="{28A0092B-C50C-407E-A947-70E740481C1C}">
                 <a14:useLocalDpi xmlns:a14="http://schemas.microsoft.com/office/drawing/2010/main" val="0"/>
               </a:ext>
               <a:ext uri="{96DAC541-7B7A-43D3-8B79-37D633B846F1}">
-                <asvg:svgBlip xmlns:asvg="http://schemas.microsoft.com/office/drawing/2016/SVG/main" r:embed="rId13"/>
+                <asvg:svgBlip xmlns:asvg="http://schemas.microsoft.com/office/drawing/2016/SVG/main" r:embed="rId11"/>
               </a:ext>
             </a:extLst>
           </a:blip>
@@ -8899,6 +8827,123 @@
           </a:p>
         </p:txBody>
       </p:sp>
+      <p:grpSp>
+        <p:nvGrpSpPr>
+          <p:cNvPr id="70" name="Group 69">
+            <a:extLst>
+              <a:ext uri="{FF2B5EF4-FFF2-40B4-BE49-F238E27FC236}">
+                <a16:creationId xmlns:a16="http://schemas.microsoft.com/office/drawing/2014/main" id="{ADC2B456-89CA-30A4-5749-F40B12E4AF9B}"/>
+              </a:ext>
+            </a:extLst>
+          </p:cNvPr>
+          <p:cNvGrpSpPr/>
+          <p:nvPr/>
+        </p:nvGrpSpPr>
+        <p:grpSpPr>
+          <a:xfrm>
+            <a:off x="3072521" y="1307580"/>
+            <a:ext cx="1142351" cy="576000"/>
+            <a:chOff x="3072521" y="1307580"/>
+            <a:chExt cx="1142351" cy="576000"/>
+          </a:xfrm>
+        </p:grpSpPr>
+        <p:sp>
+          <p:nvSpPr>
+            <p:cNvPr id="71" name="Rectangle 70">
+              <a:extLst>
+                <a:ext uri="{FF2B5EF4-FFF2-40B4-BE49-F238E27FC236}">
+                  <a16:creationId xmlns:a16="http://schemas.microsoft.com/office/drawing/2014/main" id="{D3BFF1C2-1419-4498-4B79-174A03D2FBA4}"/>
+                </a:ext>
+              </a:extLst>
+            </p:cNvPr>
+            <p:cNvSpPr/>
+            <p:nvPr/>
+          </p:nvSpPr>
+          <p:spPr>
+            <a:xfrm>
+              <a:off x="3072521" y="1307580"/>
+              <a:ext cx="1142351" cy="576000"/>
+            </a:xfrm>
+            <a:prstGeom prst="rect">
+              <a:avLst/>
+            </a:prstGeom>
+            <a:solidFill>
+              <a:schemeClr val="bg1"/>
+            </a:solidFill>
+            <a:ln w="12700">
+              <a:solidFill>
+                <a:schemeClr val="tx1">
+                  <a:lumMod val="65000"/>
+                  <a:lumOff val="35000"/>
+                </a:schemeClr>
+              </a:solidFill>
+            </a:ln>
+          </p:spPr>
+          <p:style>
+            <a:lnRef idx="2">
+              <a:schemeClr val="accent1">
+                <a:shade val="50000"/>
+              </a:schemeClr>
+            </a:lnRef>
+            <a:fillRef idx="1">
+              <a:schemeClr val="accent1"/>
+            </a:fillRef>
+            <a:effectRef idx="0">
+              <a:schemeClr val="accent1"/>
+            </a:effectRef>
+            <a:fontRef idx="minor">
+              <a:schemeClr val="lt1"/>
+            </a:fontRef>
+          </p:style>
+          <p:txBody>
+            <a:bodyPr rtlCol="0" anchor="ctr"/>
+            <a:lstStyle/>
+            <a:p>
+              <a:pPr algn="ctr"/>
+              <a:endParaRPr lang="en-US"/>
+            </a:p>
+          </p:txBody>
+        </p:sp>
+        <p:pic>
+          <p:nvPicPr>
+            <p:cNvPr id="72" name="Graphic 71">
+              <a:extLst>
+                <a:ext uri="{FF2B5EF4-FFF2-40B4-BE49-F238E27FC236}">
+                  <a16:creationId xmlns:a16="http://schemas.microsoft.com/office/drawing/2014/main" id="{44B5B0AF-2070-9A36-CC6B-212C476B25C8}"/>
+                </a:ext>
+              </a:extLst>
+            </p:cNvPr>
+            <p:cNvPicPr>
+              <a:picLocks noChangeAspect="1"/>
+            </p:cNvPicPr>
+            <p:nvPr/>
+          </p:nvPicPr>
+          <p:blipFill>
+            <a:blip r:embed="rId12">
+              <a:extLst>
+                <a:ext uri="{28A0092B-C50C-407E-A947-70E740481C1C}">
+                  <a14:useLocalDpi xmlns:a14="http://schemas.microsoft.com/office/drawing/2010/main" val="0"/>
+                </a:ext>
+                <a:ext uri="{96DAC541-7B7A-43D3-8B79-37D633B846F1}">
+                  <asvg:svgBlip xmlns:asvg="http://schemas.microsoft.com/office/drawing/2016/SVG/main" r:embed="rId13"/>
+                </a:ext>
+              </a:extLst>
+            </a:blip>
+            <a:stretch>
+              <a:fillRect/>
+            </a:stretch>
+          </p:blipFill>
+          <p:spPr>
+            <a:xfrm>
+              <a:off x="3170200" y="1396671"/>
+              <a:ext cx="970321" cy="397330"/>
+            </a:xfrm>
+            <a:prstGeom prst="rect">
+              <a:avLst/>
+            </a:prstGeom>
+          </p:spPr>
+        </p:pic>
+      </p:grpSp>
     </p:spTree>
     <p:extLst>
       <p:ext uri="{BB962C8B-B14F-4D97-AF65-F5344CB8AC3E}">

</xml_diff>

<commit_message>
Better flowcharts + Intro + Wallet UI
</commit_message>
<xml_diff>
--- a/fido-wallet-a.rundgren.pptx
+++ b/fido-wallet-a.rundgren.pptx
@@ -6,7 +6,9 @@
   </p:sldMasterIdLst>
   <p:sldIdLst>
     <p:sldId id="257" r:id="rId2"/>
-    <p:sldId id="258" r:id="rId3"/>
+    <p:sldId id="260" r:id="rId3"/>
+    <p:sldId id="258" r:id="rId4"/>
+    <p:sldId id="259" r:id="rId5"/>
   </p:sldIdLst>
   <p:sldSz cx="12192000" cy="6858000"/>
   <p:notesSz cx="6858000" cy="9144000"/>
@@ -161,7 +163,7 @@
             <a:pPr algn="r"/>
             <a:r>
               <a:rPr lang="en-US" sz="800" noProof="1"/>
-              <a:t>A.Rundgren 2022-03-10</a:t>
+              <a:t>A.Rundgren 2022-11-01</a:t>
             </a:r>
           </a:p>
         </p:txBody>
@@ -206,7 +208,7 @@
             </a:fld>
             <a:r>
               <a:rPr lang="en-US" sz="800" dirty="0"/>
-              <a:t>/2</a:t>
+              <a:t>/4</a:t>
             </a:r>
           </a:p>
         </p:txBody>
@@ -304,7 +306,7 @@
         <p:spPr>
           <a:xfrm>
             <a:off x="-6220" y="6644789"/>
-            <a:ext cx="2316660" cy="215444"/>
+            <a:ext cx="3762568" cy="215444"/>
           </a:xfrm>
           <a:prstGeom prst="rect">
             <a:avLst/>
@@ -326,7 +328,7 @@
                 <a:effectLst/>
                 <a:latin typeface="-apple-system"/>
               </a:rPr>
-              <a:t>FIDO is a registered trademark of the FIDO alliance</a:t>
+              <a:t>FIDO and EMV are registered trademarks of the FIDO alliance and EMVCo respectively</a:t>
             </a:r>
             <a:endParaRPr lang="en-US" sz="800" noProof="1"/>
           </a:p>
@@ -470,7 +472,7 @@
           <a:p>
             <a:fld id="{FAE6055B-ABBD-4C0D-84D8-CCE0D097BF9D}" type="datetimeFigureOut">
               <a:rPr lang="en-US" smtClean="0"/>
-              <a:t>2022-10-03</a:t>
+              <a:t>2022-11-02</a:t>
             </a:fld>
             <a:endParaRPr lang="en-US"/>
           </a:p>
@@ -678,7 +680,7 @@
           <a:p>
             <a:fld id="{FAE6055B-ABBD-4C0D-84D8-CCE0D097BF9D}" type="datetimeFigureOut">
               <a:rPr lang="en-US" smtClean="0"/>
-              <a:t>2022-10-03</a:t>
+              <a:t>2022-11-02</a:t>
             </a:fld>
             <a:endParaRPr lang="en-US"/>
           </a:p>
@@ -876,7 +878,7 @@
           <a:p>
             <a:fld id="{FAE6055B-ABBD-4C0D-84D8-CCE0D097BF9D}" type="datetimeFigureOut">
               <a:rPr lang="en-US" smtClean="0"/>
-              <a:t>2022-10-03</a:t>
+              <a:t>2022-11-02</a:t>
             </a:fld>
             <a:endParaRPr lang="en-US"/>
           </a:p>
@@ -1151,7 +1153,7 @@
           <a:p>
             <a:fld id="{FAE6055B-ABBD-4C0D-84D8-CCE0D097BF9D}" type="datetimeFigureOut">
               <a:rPr lang="en-US" smtClean="0"/>
-              <a:t>2022-10-03</a:t>
+              <a:t>2022-11-02</a:t>
             </a:fld>
             <a:endParaRPr lang="en-US"/>
           </a:p>
@@ -1416,7 +1418,7 @@
           <a:p>
             <a:fld id="{FAE6055B-ABBD-4C0D-84D8-CCE0D097BF9D}" type="datetimeFigureOut">
               <a:rPr lang="en-US" smtClean="0"/>
-              <a:t>2022-10-03</a:t>
+              <a:t>2022-11-02</a:t>
             </a:fld>
             <a:endParaRPr lang="en-US"/>
           </a:p>
@@ -1828,7 +1830,7 @@
           <a:p>
             <a:fld id="{FAE6055B-ABBD-4C0D-84D8-CCE0D097BF9D}" type="datetimeFigureOut">
               <a:rPr lang="en-US" smtClean="0"/>
-              <a:t>2022-10-03</a:t>
+              <a:t>2022-11-02</a:t>
             </a:fld>
             <a:endParaRPr lang="en-US"/>
           </a:p>
@@ -1969,7 +1971,7 @@
           <a:p>
             <a:fld id="{FAE6055B-ABBD-4C0D-84D8-CCE0D097BF9D}" type="datetimeFigureOut">
               <a:rPr lang="en-US" smtClean="0"/>
-              <a:t>2022-10-03</a:t>
+              <a:t>2022-11-02</a:t>
             </a:fld>
             <a:endParaRPr lang="en-US"/>
           </a:p>
@@ -2082,7 +2084,7 @@
           <a:p>
             <a:fld id="{FAE6055B-ABBD-4C0D-84D8-CCE0D097BF9D}" type="datetimeFigureOut">
               <a:rPr lang="en-US" smtClean="0"/>
-              <a:t>2022-10-03</a:t>
+              <a:t>2022-11-02</a:t>
             </a:fld>
             <a:endParaRPr lang="en-US"/>
           </a:p>
@@ -2393,7 +2395,7 @@
           <a:p>
             <a:fld id="{FAE6055B-ABBD-4C0D-84D8-CCE0D097BF9D}" type="datetimeFigureOut">
               <a:rPr lang="en-US" smtClean="0"/>
-              <a:t>2022-10-03</a:t>
+              <a:t>2022-11-02</a:t>
             </a:fld>
             <a:endParaRPr lang="en-US"/>
           </a:p>
@@ -2681,7 +2683,7 @@
           <a:p>
             <a:fld id="{FAE6055B-ABBD-4C0D-84D8-CCE0D097BF9D}" type="datetimeFigureOut">
               <a:rPr lang="en-US" smtClean="0"/>
-              <a:t>2022-10-03</a:t>
+              <a:t>2022-11-02</a:t>
             </a:fld>
             <a:endParaRPr lang="en-US"/>
           </a:p>
@@ -2922,7 +2924,7 @@
           <a:p>
             <a:fld id="{FAE6055B-ABBD-4C0D-84D8-CCE0D097BF9D}" type="datetimeFigureOut">
               <a:rPr lang="en-US" smtClean="0"/>
-              <a:t>2022-10-03</a:t>
+              <a:t>2022-11-02</a:t>
             </a:fld>
             <a:endParaRPr lang="en-US"/>
           </a:p>
@@ -3341,6 +3343,209 @@
       </p:grpSpPr>
       <p:sp>
         <p:nvSpPr>
+          <p:cNvPr id="4" name="TextBox 3">
+            <a:extLst>
+              <a:ext uri="{FF2B5EF4-FFF2-40B4-BE49-F238E27FC236}">
+                <a16:creationId xmlns:a16="http://schemas.microsoft.com/office/drawing/2014/main" id="{E8061992-EA1A-B21C-F268-8EE3B525AF3E}"/>
+              </a:ext>
+            </a:extLst>
+          </p:cNvPr>
+          <p:cNvSpPr txBox="1"/>
+          <p:nvPr/>
+        </p:nvSpPr>
+        <p:spPr>
+          <a:xfrm>
+            <a:off x="3434376" y="1717143"/>
+            <a:ext cx="5343129" cy="369332"/>
+          </a:xfrm>
+          <a:prstGeom prst="rect">
+            <a:avLst/>
+          </a:prstGeom>
+          <a:noFill/>
+        </p:spPr>
+        <p:txBody>
+          <a:bodyPr wrap="none" rtlCol="0">
+            <a:spAutoFit/>
+          </a:bodyPr>
+          <a:lstStyle/>
+          <a:p>
+            <a:pPr algn="ctr"/>
+            <a:r>
+              <a:rPr lang="en-US" dirty="0">
+                <a:latin typeface="Roboto Medium" panose="02000000000000000000" pitchFamily="2" charset="0"/>
+                <a:ea typeface="Roboto Medium" panose="02000000000000000000" pitchFamily="2" charset="0"/>
+              </a:rPr>
+              <a:t>Combining FIDO2®/CTAP2 with a Payment Wallet</a:t>
+            </a:r>
+            <a:endParaRPr lang="en-US" i="1" dirty="0">
+              <a:latin typeface="Roboto Medium" panose="02000000000000000000" pitchFamily="2" charset="0"/>
+              <a:ea typeface="Roboto Medium" panose="02000000000000000000" pitchFamily="2" charset="0"/>
+            </a:endParaRPr>
+          </a:p>
+        </p:txBody>
+      </p:sp>
+      <p:sp>
+        <p:nvSpPr>
+          <p:cNvPr id="42" name="TextBox 41">
+            <a:extLst>
+              <a:ext uri="{FF2B5EF4-FFF2-40B4-BE49-F238E27FC236}">
+                <a16:creationId xmlns:a16="http://schemas.microsoft.com/office/drawing/2014/main" id="{4426AEE9-BF6D-B40D-746D-355B1E6CB87E}"/>
+              </a:ext>
+            </a:extLst>
+          </p:cNvPr>
+          <p:cNvSpPr txBox="1"/>
+          <p:nvPr/>
+        </p:nvSpPr>
+        <p:spPr>
+          <a:xfrm>
+            <a:off x="2774106" y="2463752"/>
+            <a:ext cx="6898170" cy="3293209"/>
+          </a:xfrm>
+          <a:prstGeom prst="rect">
+            <a:avLst/>
+          </a:prstGeom>
+          <a:noFill/>
+        </p:spPr>
+        <p:txBody>
+          <a:bodyPr wrap="none" rtlCol="0">
+            <a:spAutoFit/>
+          </a:bodyPr>
+          <a:lstStyle/>
+          <a:p>
+            <a:r>
+              <a:rPr lang="en-US" sz="1600" dirty="0"/>
+              <a:t>This presentation outlines how the FIDO2</a:t>
+            </a:r>
+            <a:r>
+              <a:rPr lang="en-US" sz="1600" dirty="0">
+                <a:latin typeface="Roboto Medium" panose="02000000000000000000" pitchFamily="2" charset="0"/>
+                <a:ea typeface="Roboto Medium" panose="02000000000000000000" pitchFamily="2" charset="0"/>
+              </a:rPr>
+              <a:t>®</a:t>
+            </a:r>
+            <a:r>
+              <a:rPr lang="en-US" sz="1600" dirty="0"/>
+              <a:t>/CTAP2 API and the W3C </a:t>
+            </a:r>
+            <a:r>
+              <a:rPr lang="en-US" sz="1600" dirty="0" err="1"/>
+              <a:t>WebAuthn</a:t>
+            </a:r>
+            <a:r>
+              <a:rPr lang="en-US" sz="1600" dirty="0"/>
+              <a:t> </a:t>
+            </a:r>
+          </a:p>
+          <a:p>
+            <a:r>
+              <a:rPr lang="en-US" sz="1600" dirty="0"/>
+              <a:t>standard could be augmented with meta data holding virtual payment cards.</a:t>
+            </a:r>
+          </a:p>
+          <a:p>
+            <a:endParaRPr lang="en-US" sz="1600" dirty="0"/>
+          </a:p>
+          <a:p>
+            <a:r>
+              <a:rPr lang="en-US" sz="1600" dirty="0"/>
+              <a:t>The authorization system builds on an enhanced EMV</a:t>
+            </a:r>
+            <a:r>
+              <a:rPr lang="en-US" sz="1600" dirty="0">
+                <a:latin typeface="Roboto Medium" panose="02000000000000000000" pitchFamily="2" charset="0"/>
+                <a:ea typeface="Roboto Medium" panose="02000000000000000000" pitchFamily="2" charset="0"/>
+              </a:rPr>
+              <a:t>®</a:t>
+            </a:r>
+            <a:r>
+              <a:rPr lang="en-US" sz="1600" dirty="0"/>
+              <a:t> concept, where a card</a:t>
+            </a:r>
+            <a:br>
+              <a:rPr lang="en-US" sz="1600" dirty="0"/>
+            </a:br>
+            <a:r>
+              <a:rPr lang="en-US" sz="1600" dirty="0"/>
+              <a:t>can represent any account based payment scheme, including the international</a:t>
+            </a:r>
+            <a:br>
+              <a:rPr lang="en-US" sz="1600" dirty="0"/>
+            </a:br>
+            <a:r>
+              <a:rPr lang="en-US" sz="1600" dirty="0"/>
+              <a:t>card networks and SEPA, as well as national networks.</a:t>
+            </a:r>
+          </a:p>
+          <a:p>
+            <a:endParaRPr lang="en-US" sz="1600" dirty="0"/>
+          </a:p>
+          <a:p>
+            <a:r>
+              <a:rPr lang="en-US" sz="1600" dirty="0"/>
+              <a:t>Although not shown here, a card is after registration, also intended to be usable</a:t>
+            </a:r>
+          </a:p>
+          <a:p>
+            <a:r>
+              <a:rPr lang="en-US" sz="1600" dirty="0"/>
+              <a:t>for payments at the counter (POS).  P2P payment support is also in scope.</a:t>
+            </a:r>
+          </a:p>
+          <a:p>
+            <a:br>
+              <a:rPr lang="en-US" sz="1600" dirty="0"/>
+            </a:br>
+            <a:r>
+              <a:rPr lang="en-US" sz="1600" dirty="0"/>
+              <a:t>A detailed description of the actual data exchanges is available at:</a:t>
+            </a:r>
+          </a:p>
+          <a:p>
+            <a:r>
+              <a:rPr lang="en-US" sz="1600" dirty="0">
+                <a:hlinkClick r:id="rId2"/>
+              </a:rPr>
+              <a:t>https://fido-web-pay.github.io/</a:t>
+            </a:r>
+            <a:endParaRPr lang="en-US" sz="1600" dirty="0"/>
+          </a:p>
+          <a:p>
+            <a:endParaRPr lang="en-US" sz="1600" dirty="0"/>
+          </a:p>
+        </p:txBody>
+      </p:sp>
+    </p:spTree>
+    <p:extLst>
+      <p:ext uri="{BB962C8B-B14F-4D97-AF65-F5344CB8AC3E}">
+        <p14:creationId xmlns:p14="http://schemas.microsoft.com/office/powerpoint/2010/main" val="1474752703"/>
+      </p:ext>
+    </p:extLst>
+  </p:cSld>
+  <p:clrMapOvr>
+    <a:masterClrMapping/>
+  </p:clrMapOvr>
+</p:sld>
+</file>
+
+<file path=ppt/slides/slide2.xml><?xml version="1.0" encoding="utf-8"?>
+<p:sld xmlns:a="http://schemas.openxmlformats.org/drawingml/2006/main" xmlns:r="http://schemas.openxmlformats.org/officeDocument/2006/relationships" xmlns:p="http://schemas.openxmlformats.org/presentationml/2006/main">
+  <p:cSld>
+    <p:spTree>
+      <p:nvGrpSpPr>
+        <p:cNvPr id="1" name=""/>
+        <p:cNvGrpSpPr/>
+        <p:nvPr/>
+      </p:nvGrpSpPr>
+      <p:grpSpPr>
+        <a:xfrm>
+          <a:off x="0" y="0"/>
+          <a:ext cx="0" cy="0"/>
+          <a:chOff x="0" y="0"/>
+          <a:chExt cx="0" cy="0"/>
+        </a:xfrm>
+      </p:grpSpPr>
+      <p:sp>
+        <p:nvSpPr>
           <p:cNvPr id="14" name="Rectangle 13">
             <a:extLst>
               <a:ext uri="{FF2B5EF4-FFF2-40B4-BE49-F238E27FC236}">
@@ -3494,8 +3699,8 @@
         </p:nvSpPr>
         <p:spPr>
           <a:xfrm>
-            <a:off x="3200017" y="90559"/>
-            <a:ext cx="5791970" cy="369332"/>
+            <a:off x="4304486" y="90559"/>
+            <a:ext cx="3583032" cy="369332"/>
           </a:xfrm>
           <a:prstGeom prst="rect">
             <a:avLst/>
@@ -3514,14 +3719,14 @@
                 <a:latin typeface="Roboto Medium" panose="02000000000000000000" pitchFamily="2" charset="0"/>
                 <a:ea typeface="Roboto Medium" panose="02000000000000000000" pitchFamily="2" charset="0"/>
               </a:rPr>
-              <a:t>Combining FIDO2®/CTAP2 with a Wallet - </a:t>
+              <a:t>Wallet – </a:t>
             </a:r>
             <a:r>
               <a:rPr lang="en-US" i="1" dirty="0">
                 <a:latin typeface="Roboto Medium" panose="02000000000000000000" pitchFamily="2" charset="0"/>
                 <a:ea typeface="Roboto Medium" panose="02000000000000000000" pitchFamily="2" charset="0"/>
               </a:rPr>
-              <a:t>Registration</a:t>
+              <a:t>Virtual Card Registration</a:t>
             </a:r>
           </a:p>
         </p:txBody>
@@ -4276,10 +4481,10 @@
       </p:sp>
       <p:sp>
         <p:nvSpPr>
-          <p:cNvPr id="3" name="Rectangle: Rounded Corners 2">
-            <a:extLst>
-              <a:ext uri="{FF2B5EF4-FFF2-40B4-BE49-F238E27FC236}">
-                <a16:creationId xmlns:a16="http://schemas.microsoft.com/office/drawing/2014/main" id="{E43E6AF3-B417-DE07-F95D-8CF08B8F453D}"/>
+          <p:cNvPr id="5" name="Arrow: Left-Right 4">
+            <a:extLst>
+              <a:ext uri="{FF2B5EF4-FFF2-40B4-BE49-F238E27FC236}">
+                <a16:creationId xmlns:a16="http://schemas.microsoft.com/office/drawing/2014/main" id="{8A4843D8-11AB-93FA-D753-DA207A0B889C}"/>
               </a:ext>
             </a:extLst>
           </p:cNvPr>
@@ -4288,90 +4493,8 @@
         </p:nvSpPr>
         <p:spPr>
           <a:xfrm>
-            <a:off x="4584120" y="2700032"/>
-            <a:ext cx="1070580" cy="603405"/>
-          </a:xfrm>
-          <a:prstGeom prst="roundRect">
-            <a:avLst>
-              <a:gd name="adj" fmla="val 11108"/>
-            </a:avLst>
-          </a:prstGeom>
-          <a:solidFill>
-            <a:schemeClr val="accent5">
-              <a:lumMod val="20000"/>
-              <a:lumOff val="80000"/>
-            </a:schemeClr>
-          </a:solidFill>
-          <a:ln>
-            <a:solidFill>
-              <a:schemeClr val="tx1">
-                <a:lumMod val="75000"/>
-                <a:lumOff val="25000"/>
-              </a:schemeClr>
-            </a:solidFill>
-          </a:ln>
-        </p:spPr>
-        <p:style>
-          <a:lnRef idx="2">
-            <a:schemeClr val="accent1">
-              <a:shade val="50000"/>
-            </a:schemeClr>
-          </a:lnRef>
-          <a:fillRef idx="1">
-            <a:schemeClr val="accent1"/>
-          </a:fillRef>
-          <a:effectRef idx="0">
-            <a:schemeClr val="accent1"/>
-          </a:effectRef>
-          <a:fontRef idx="minor">
-            <a:schemeClr val="lt1"/>
-          </a:fontRef>
-        </p:style>
-        <p:txBody>
-          <a:bodyPr wrap="none" lIns="72000" tIns="36000" rIns="72000" bIns="36000" rtlCol="0" anchor="ctr">
-            <a:spAutoFit/>
-          </a:bodyPr>
-          <a:lstStyle/>
-          <a:p>
-            <a:pPr algn="ctr"/>
-            <a:r>
-              <a:rPr lang="en-US" sz="1600" noProof="1">
-                <a:solidFill>
-                  <a:schemeClr val="tx1"/>
-                </a:solidFill>
-              </a:rPr>
-              <a:t>WebAuthn</a:t>
-            </a:r>
-          </a:p>
-          <a:p>
-            <a:pPr algn="ctr"/>
-            <a:r>
-              <a:rPr lang="en-US" sz="1600" dirty="0">
-                <a:solidFill>
-                  <a:schemeClr val="tx1"/>
-                </a:solidFill>
-              </a:rPr>
-              <a:t>“register”</a:t>
-            </a:r>
-          </a:p>
-        </p:txBody>
-      </p:sp>
-      <p:sp>
-        <p:nvSpPr>
-          <p:cNvPr id="5" name="Arrow: Left-Right 4">
-            <a:extLst>
-              <a:ext uri="{FF2B5EF4-FFF2-40B4-BE49-F238E27FC236}">
-                <a16:creationId xmlns:a16="http://schemas.microsoft.com/office/drawing/2014/main" id="{8A4843D8-11AB-93FA-D753-DA207A0B889C}"/>
-              </a:ext>
-            </a:extLst>
-          </p:cNvPr>
-          <p:cNvSpPr/>
-          <p:nvPr/>
-        </p:nvSpPr>
-        <p:spPr>
-          <a:xfrm>
-            <a:off x="3687891" y="2934644"/>
-            <a:ext cx="864000" cy="154800"/>
+            <a:off x="3680271" y="3083729"/>
+            <a:ext cx="828000" cy="154800"/>
           </a:xfrm>
           <a:prstGeom prst="leftRightArrow">
             <a:avLst>
@@ -4549,7 +4672,7 @@
         </p:nvCxnSpPr>
         <p:spPr>
           <a:xfrm>
-            <a:off x="675596" y="3006820"/>
+            <a:off x="675596" y="3155905"/>
             <a:ext cx="2934000" cy="0"/>
           </a:xfrm>
           <a:prstGeom prst="straightConnector1">
@@ -4594,7 +4717,7 @@
         </p:nvSpPr>
         <p:spPr>
           <a:xfrm>
-            <a:off x="718900" y="2699112"/>
+            <a:off x="718900" y="2848197"/>
             <a:ext cx="994375" cy="338554"/>
           </a:xfrm>
           <a:prstGeom prst="rect">
@@ -4629,7 +4752,7 @@
         </p:nvSpPr>
         <p:spPr>
           <a:xfrm>
-            <a:off x="3773518" y="2672610"/>
+            <a:off x="3742210" y="2821695"/>
             <a:ext cx="706668" cy="338554"/>
           </a:xfrm>
           <a:prstGeom prst="rect">
@@ -4666,7 +4789,7 @@
         <p:spPr>
           <a:xfrm>
             <a:off x="2190397" y="5432667"/>
-            <a:ext cx="1422000" cy="154800"/>
+            <a:ext cx="1429200" cy="154800"/>
           </a:xfrm>
           <a:prstGeom prst="leftRightArrow">
             <a:avLst>
@@ -4760,14 +4883,14 @@
             </a:extLst>
           </p:cNvPr>
           <p:cNvCxnSpPr>
-            <a:stCxn id="3" idx="3"/>
+            <a:cxnSpLocks/>
           </p:cNvCxnSpPr>
           <p:nvPr/>
         </p:nvCxnSpPr>
         <p:spPr>
           <a:xfrm flipV="1">
-            <a:off x="5654700" y="2996881"/>
-            <a:ext cx="3654000" cy="4854"/>
+            <a:off x="5664762" y="3145966"/>
+            <a:ext cx="3643938" cy="4854"/>
           </a:xfrm>
           <a:prstGeom prst="straightConnector1">
             <a:avLst/>
@@ -4808,7 +4931,7 @@
         </p:nvSpPr>
         <p:spPr>
           <a:xfrm>
-            <a:off x="6132948" y="2692485"/>
+            <a:off x="6132948" y="2841570"/>
             <a:ext cx="2696187" cy="338554"/>
           </a:xfrm>
           <a:prstGeom prst="rect">
@@ -5084,7 +5207,7 @@
         </p:nvSpPr>
         <p:spPr>
           <a:xfrm>
-            <a:off x="1148139" y="4547803"/>
+            <a:off x="1148139" y="4587559"/>
             <a:ext cx="2010487" cy="505267"/>
           </a:xfrm>
           <a:prstGeom prst="rect">
@@ -5795,8 +5918,8 @@
         </p:nvSpPr>
         <p:spPr>
           <a:xfrm>
-            <a:off x="4280550" y="3970461"/>
-            <a:ext cx="1681823" cy="2268000"/>
+            <a:off x="4278274" y="3975854"/>
+            <a:ext cx="1686374" cy="2217458"/>
           </a:xfrm>
           <a:prstGeom prst="roundRect">
             <a:avLst>
@@ -5835,10 +5958,18 @@
           </a:fontRef>
         </p:style>
         <p:txBody>
-          <a:bodyPr wrap="none" lIns="72000" tIns="36000" rIns="72000" bIns="36000" rtlCol="0" anchor="ctr">
+          <a:bodyPr wrap="none" lIns="90000" tIns="72000" rIns="90000" bIns="72000" rtlCol="0" anchor="ctr">
             <a:spAutoFit/>
           </a:bodyPr>
           <a:lstStyle/>
+          <a:p>
+            <a:pPr algn="ctr"/>
+            <a:endParaRPr lang="en-US" sz="1600" dirty="0">
+              <a:solidFill>
+                <a:schemeClr val="tx1"/>
+              </a:solidFill>
+            </a:endParaRPr>
+          </a:p>
           <a:p>
             <a:pPr algn="ctr"/>
             <a:r>
@@ -5862,7 +5993,7 @@
                   <a:schemeClr val="tx1"/>
                 </a:solidFill>
               </a:rPr>
-              <a:t>(new)</a:t>
+              <a:t>(TBD)</a:t>
             </a:r>
             <a:br>
               <a:rPr lang="en-US" sz="1600" dirty="0">
@@ -5933,6 +6064,14 @@
               </a:rPr>
               <a:t> from each other</a:t>
             </a:r>
+          </a:p>
+          <a:p>
+            <a:endParaRPr lang="en-US" sz="1600" dirty="0">
+              <a:solidFill>
+                <a:schemeClr val="tx1"/>
+              </a:solidFill>
+              <a:cs typeface="Courier New" panose="02070309020205020404" pitchFamily="49" charset="0"/>
+            </a:endParaRPr>
           </a:p>
         </p:txBody>
       </p:sp>
@@ -6053,10 +6192,103 @@
           </p:spPr>
         </p:pic>
       </p:grpSp>
+      <p:sp>
+        <p:nvSpPr>
+          <p:cNvPr id="3" name="Rectangle: Rounded Corners 2">
+            <a:extLst>
+              <a:ext uri="{FF2B5EF4-FFF2-40B4-BE49-F238E27FC236}">
+                <a16:creationId xmlns:a16="http://schemas.microsoft.com/office/drawing/2014/main" id="{E43E6AF3-B417-DE07-F95D-8CF08B8F453D}"/>
+              </a:ext>
+            </a:extLst>
+          </p:cNvPr>
+          <p:cNvSpPr/>
+          <p:nvPr/>
+        </p:nvSpPr>
+        <p:spPr>
+          <a:xfrm>
+            <a:off x="4535949" y="2678860"/>
+            <a:ext cx="1166923" cy="943920"/>
+          </a:xfrm>
+          <a:prstGeom prst="roundRect">
+            <a:avLst>
+              <a:gd name="adj" fmla="val 11108"/>
+            </a:avLst>
+          </a:prstGeom>
+          <a:solidFill>
+            <a:schemeClr val="accent5">
+              <a:lumMod val="20000"/>
+              <a:lumOff val="80000"/>
+            </a:schemeClr>
+          </a:solidFill>
+          <a:ln>
+            <a:solidFill>
+              <a:schemeClr val="tx1">
+                <a:lumMod val="75000"/>
+                <a:lumOff val="25000"/>
+              </a:schemeClr>
+            </a:solidFill>
+          </a:ln>
+        </p:spPr>
+        <p:style>
+          <a:lnRef idx="2">
+            <a:schemeClr val="accent1">
+              <a:shade val="50000"/>
+            </a:schemeClr>
+          </a:lnRef>
+          <a:fillRef idx="1">
+            <a:schemeClr val="accent1"/>
+          </a:fillRef>
+          <a:effectRef idx="0">
+            <a:schemeClr val="accent1"/>
+          </a:effectRef>
+          <a:fontRef idx="minor">
+            <a:schemeClr val="lt1"/>
+          </a:fontRef>
+        </p:style>
+        <p:txBody>
+          <a:bodyPr wrap="none" lIns="108000" tIns="72000" rIns="108000" bIns="72000" rtlCol="0" anchor="ctr">
+            <a:spAutoFit/>
+          </a:bodyPr>
+          <a:lstStyle/>
+          <a:p>
+            <a:pPr algn="ctr"/>
+            <a:r>
+              <a:rPr lang="en-US" sz="1600" noProof="1">
+                <a:solidFill>
+                  <a:schemeClr val="tx1"/>
+                </a:solidFill>
+              </a:rPr>
+              <a:t>W3C</a:t>
+            </a:r>
+          </a:p>
+          <a:p>
+            <a:pPr algn="ctr"/>
+            <a:r>
+              <a:rPr lang="en-US" sz="1600" noProof="1">
+                <a:solidFill>
+                  <a:schemeClr val="tx1"/>
+                </a:solidFill>
+              </a:rPr>
+              <a:t>WebAuthn</a:t>
+            </a:r>
+          </a:p>
+          <a:p>
+            <a:pPr algn="ctr"/>
+            <a:r>
+              <a:rPr lang="en-US" sz="1600" dirty="0">
+                <a:solidFill>
+                  <a:schemeClr val="tx1"/>
+                </a:solidFill>
+              </a:rPr>
+              <a:t>"register"</a:t>
+            </a:r>
+          </a:p>
+        </p:txBody>
+      </p:sp>
     </p:spTree>
     <p:extLst>
       <p:ext uri="{BB962C8B-B14F-4D97-AF65-F5344CB8AC3E}">
-        <p14:creationId xmlns:p14="http://schemas.microsoft.com/office/powerpoint/2010/main" val="1474752703"/>
+        <p14:creationId xmlns:p14="http://schemas.microsoft.com/office/powerpoint/2010/main" val="2573515715"/>
       </p:ext>
     </p:extLst>
   </p:cSld>
@@ -6066,7 +6298,7 @@
 </p:sld>
 </file>
 
-<file path=ppt/slides/slide2.xml><?xml version="1.0" encoding="utf-8"?>
+<file path=ppt/slides/slide3.xml><?xml version="1.0" encoding="utf-8"?>
 <p:sld xmlns:a="http://schemas.openxmlformats.org/drawingml/2006/main" xmlns:r="http://schemas.openxmlformats.org/officeDocument/2006/relationships" xmlns:p="http://schemas.openxmlformats.org/presentationml/2006/main">
   <p:cSld>
     <p:spTree>
@@ -6322,8 +6554,8 @@
         </p:nvSpPr>
         <p:spPr>
           <a:xfrm>
-            <a:off x="2619734" y="90559"/>
-            <a:ext cx="6952544" cy="369332"/>
+            <a:off x="4389446" y="90559"/>
+            <a:ext cx="3413114" cy="369332"/>
           </a:xfrm>
           <a:prstGeom prst="rect">
             <a:avLst/>
@@ -6342,7 +6574,7 @@
                 <a:latin typeface="Roboto Medium" panose="02000000000000000000" pitchFamily="2" charset="0"/>
                 <a:ea typeface="Roboto Medium" panose="02000000000000000000" pitchFamily="2" charset="0"/>
               </a:rPr>
-              <a:t>Combining FIDO2®/CTAP2 with a Wallet – </a:t>
+              <a:t>Wallet – </a:t>
             </a:r>
             <a:r>
               <a:rPr lang="en-US" i="1" dirty="0">
@@ -7102,82 +7334,6 @@
           </a:p>
         </p:txBody>
       </p:sp>
-      <p:sp>
-        <p:nvSpPr>
-          <p:cNvPr id="3" name="Rectangle: Rounded Corners 2">
-            <a:extLst>
-              <a:ext uri="{FF2B5EF4-FFF2-40B4-BE49-F238E27FC236}">
-                <a16:creationId xmlns:a16="http://schemas.microsoft.com/office/drawing/2014/main" id="{E43E6AF3-B417-DE07-F95D-8CF08B8F453D}"/>
-              </a:ext>
-            </a:extLst>
-          </p:cNvPr>
-          <p:cNvSpPr/>
-          <p:nvPr/>
-        </p:nvSpPr>
-        <p:spPr>
-          <a:xfrm>
-            <a:off x="4113748" y="2727428"/>
-            <a:ext cx="2016000" cy="3168000"/>
-          </a:xfrm>
-          <a:prstGeom prst="roundRect">
-            <a:avLst>
-              <a:gd name="adj" fmla="val 11108"/>
-            </a:avLst>
-          </a:prstGeom>
-          <a:solidFill>
-            <a:schemeClr val="accent5">
-              <a:lumMod val="20000"/>
-              <a:lumOff val="80000"/>
-            </a:schemeClr>
-          </a:solidFill>
-          <a:ln>
-            <a:solidFill>
-              <a:schemeClr val="tx1">
-                <a:lumMod val="75000"/>
-                <a:lumOff val="25000"/>
-              </a:schemeClr>
-            </a:solidFill>
-          </a:ln>
-        </p:spPr>
-        <p:style>
-          <a:lnRef idx="2">
-            <a:schemeClr val="accent1">
-              <a:shade val="50000"/>
-            </a:schemeClr>
-          </a:lnRef>
-          <a:fillRef idx="1">
-            <a:schemeClr val="accent1"/>
-          </a:fillRef>
-          <a:effectRef idx="0">
-            <a:schemeClr val="accent1"/>
-          </a:effectRef>
-          <a:fontRef idx="minor">
-            <a:schemeClr val="lt1"/>
-          </a:fontRef>
-        </p:style>
-        <p:txBody>
-          <a:bodyPr wrap="none" lIns="72000" tIns="36000" rIns="72000" bIns="36000" rtlCol="0" anchor="ctr">
-            <a:spAutoFit/>
-          </a:bodyPr>
-          <a:lstStyle/>
-          <a:p>
-            <a:pPr algn="ctr"/>
-            <a:r>
-              <a:rPr lang="en-US" sz="1600" noProof="1">
-                <a:solidFill>
-                  <a:schemeClr val="tx1"/>
-                </a:solidFill>
-              </a:rPr>
-              <a:t>W3C PaymentRequest</a:t>
-            </a:r>
-            <a:endParaRPr lang="en-US" sz="1600" dirty="0">
-              <a:solidFill>
-                <a:schemeClr val="tx1"/>
-              </a:solidFill>
-            </a:endParaRPr>
-          </a:p>
-        </p:txBody>
-      </p:sp>
       <p:cxnSp>
         <p:nvCxnSpPr>
           <p:cNvPr id="10" name="Straight Arrow Connector 9">
@@ -7303,12 +7459,14 @@
               </a:ext>
             </a:extLst>
           </p:cNvPr>
-          <p:cNvCxnSpPr/>
+          <p:cNvCxnSpPr>
+            <a:cxnSpLocks/>
+          </p:cNvCxnSpPr>
           <p:nvPr/>
         </p:nvCxnSpPr>
         <p:spPr>
           <a:xfrm>
-            <a:off x="675596" y="3304990"/>
+            <a:off x="688851" y="3970909"/>
             <a:ext cx="1458000" cy="0"/>
           </a:xfrm>
           <a:prstGeom prst="straightConnector1">
@@ -7353,7 +7511,7 @@
         </p:nvSpPr>
         <p:spPr>
           <a:xfrm>
-            <a:off x="718900" y="2997282"/>
+            <a:off x="738779" y="3663201"/>
             <a:ext cx="1092222" cy="338554"/>
           </a:xfrm>
           <a:prstGeom prst="rect">
@@ -7388,7 +7546,7 @@
         </p:nvSpPr>
         <p:spPr>
           <a:xfrm>
-            <a:off x="2598453" y="4542677"/>
+            <a:off x="2610712" y="5665795"/>
             <a:ext cx="1008000" cy="154800"/>
           </a:xfrm>
           <a:prstGeom prst="leftRightArrow">
@@ -7451,7 +7609,7 @@
         </p:nvSpPr>
         <p:spPr>
           <a:xfrm>
-            <a:off x="2743673" y="4283118"/>
+            <a:off x="2763552" y="5406236"/>
             <a:ext cx="706668" cy="338554"/>
           </a:xfrm>
           <a:prstGeom prst="rect">
@@ -7673,8 +7831,8 @@
         </p:nvCxnSpPr>
         <p:spPr>
           <a:xfrm flipH="1">
-            <a:off x="2182696" y="3000938"/>
-            <a:ext cx="1926000" cy="0"/>
+            <a:off x="2182696" y="3006705"/>
+            <a:ext cx="2196000" cy="0"/>
           </a:xfrm>
           <a:prstGeom prst="straightConnector1">
             <a:avLst/>
@@ -7715,7 +7873,7 @@
         </p:nvSpPr>
         <p:spPr>
           <a:xfrm>
-            <a:off x="781070" y="3271970"/>
+            <a:off x="2152669" y="3798743"/>
             <a:ext cx="1001300" cy="338554"/>
           </a:xfrm>
           <a:prstGeom prst="rect">
@@ -7736,51 +7894,6 @@
           </a:p>
         </p:txBody>
       </p:sp>
-      <p:cxnSp>
-        <p:nvCxnSpPr>
-          <p:cNvPr id="65" name="Straight Arrow Connector 64">
-            <a:extLst>
-              <a:ext uri="{FF2B5EF4-FFF2-40B4-BE49-F238E27FC236}">
-                <a16:creationId xmlns:a16="http://schemas.microsoft.com/office/drawing/2014/main" id="{769F0D87-1CB9-B265-CBE0-7A8DEDE5D8B5}"/>
-              </a:ext>
-            </a:extLst>
-          </p:cNvPr>
-          <p:cNvCxnSpPr/>
-          <p:nvPr/>
-        </p:nvCxnSpPr>
-        <p:spPr>
-          <a:xfrm>
-            <a:off x="668968" y="5121240"/>
-            <a:ext cx="2952000" cy="0"/>
-          </a:xfrm>
-          <a:prstGeom prst="straightConnector1">
-            <a:avLst/>
-          </a:prstGeom>
-          <a:ln w="12700">
-            <a:solidFill>
-              <a:schemeClr val="accent2">
-                <a:lumMod val="75000"/>
-              </a:schemeClr>
-            </a:solidFill>
-            <a:prstDash val="dash"/>
-            <a:tailEnd type="triangle"/>
-          </a:ln>
-        </p:spPr>
-        <p:style>
-          <a:lnRef idx="1">
-            <a:schemeClr val="accent1"/>
-          </a:lnRef>
-          <a:fillRef idx="0">
-            <a:schemeClr val="accent1"/>
-          </a:fillRef>
-          <a:effectRef idx="0">
-            <a:schemeClr val="accent1"/>
-          </a:effectRef>
-          <a:fontRef idx="minor">
-            <a:schemeClr val="tx1"/>
-          </a:fontRef>
-        </p:style>
-      </p:cxnSp>
       <p:sp>
         <p:nvSpPr>
           <p:cNvPr id="66" name="TextBox 65">
@@ -7795,7 +7908,7 @@
         </p:nvSpPr>
         <p:spPr>
           <a:xfrm>
-            <a:off x="718896" y="4816129"/>
+            <a:off x="738775" y="3981242"/>
             <a:ext cx="994375" cy="338554"/>
           </a:xfrm>
           <a:prstGeom prst="rect">
@@ -7869,7 +7982,7 @@
         </p:nvSpPr>
         <p:spPr>
           <a:xfrm>
-            <a:off x="868059" y="4468294"/>
+            <a:off x="887938" y="5591412"/>
             <a:ext cx="1688284" cy="300082"/>
           </a:xfrm>
           <a:prstGeom prst="rect">
@@ -7910,10 +8023,10 @@
       </p:sp>
       <p:cxnSp>
         <p:nvCxnSpPr>
-          <p:cNvPr id="23" name="Straight Arrow Connector 22">
-            <a:extLst>
-              <a:ext uri="{FF2B5EF4-FFF2-40B4-BE49-F238E27FC236}">
-                <a16:creationId xmlns:a16="http://schemas.microsoft.com/office/drawing/2014/main" id="{49791F67-41E6-24FC-04E3-B335F5B653ED}"/>
+          <p:cNvPr id="25" name="Straight Arrow Connector 24">
+            <a:extLst>
+              <a:ext uri="{FF2B5EF4-FFF2-40B4-BE49-F238E27FC236}">
+                <a16:creationId xmlns:a16="http://schemas.microsoft.com/office/drawing/2014/main" id="{B866FDB2-80C4-D215-EC70-8E4FDC9229A7}"/>
               </a:ext>
             </a:extLst>
           </p:cNvPr>
@@ -7924,8 +8037,8 @@
         </p:nvCxnSpPr>
         <p:spPr>
           <a:xfrm>
-            <a:off x="3116097" y="5588422"/>
-            <a:ext cx="972000" cy="0"/>
+            <a:off x="5904000" y="3007581"/>
+            <a:ext cx="1116000" cy="0"/>
           </a:xfrm>
           <a:prstGeom prst="straightConnector1">
             <a:avLst/>
@@ -7952,12 +8065,48 @@
           </a:fontRef>
         </p:style>
       </p:cxnSp>
+      <p:sp>
+        <p:nvSpPr>
+          <p:cNvPr id="30" name="TextBox 29">
+            <a:extLst>
+              <a:ext uri="{FF2B5EF4-FFF2-40B4-BE49-F238E27FC236}">
+                <a16:creationId xmlns:a16="http://schemas.microsoft.com/office/drawing/2014/main" id="{7411CC50-CB54-E1A9-3DDF-6DDF73471320}"/>
+              </a:ext>
+            </a:extLst>
+          </p:cNvPr>
+          <p:cNvSpPr txBox="1"/>
+          <p:nvPr/>
+        </p:nvSpPr>
+        <p:spPr>
+          <a:xfrm>
+            <a:off x="6095090" y="2701893"/>
+            <a:ext cx="698846" cy="338554"/>
+          </a:xfrm>
+          <a:prstGeom prst="rect">
+            <a:avLst/>
+          </a:prstGeom>
+          <a:noFill/>
+        </p:spPr>
+        <p:txBody>
+          <a:bodyPr wrap="none" rtlCol="0">
+            <a:spAutoFit/>
+          </a:bodyPr>
+          <a:lstStyle/>
+          <a:p>
+            <a:pPr algn="ctr"/>
+            <a:r>
+              <a:rPr lang="en-US" sz="1600" dirty="0"/>
+              <a:t>Result</a:t>
+            </a:r>
+          </a:p>
+        </p:txBody>
+      </p:sp>
       <p:cxnSp>
         <p:nvCxnSpPr>
-          <p:cNvPr id="25" name="Straight Arrow Connector 24">
-            <a:extLst>
-              <a:ext uri="{FF2B5EF4-FFF2-40B4-BE49-F238E27FC236}">
-                <a16:creationId xmlns:a16="http://schemas.microsoft.com/office/drawing/2014/main" id="{B866FDB2-80C4-D215-EC70-8E4FDC9229A7}"/>
+          <p:cNvPr id="34" name="Straight Arrow Connector 33">
+            <a:extLst>
+              <a:ext uri="{FF2B5EF4-FFF2-40B4-BE49-F238E27FC236}">
+                <a16:creationId xmlns:a16="http://schemas.microsoft.com/office/drawing/2014/main" id="{3A8987B3-24BB-BBB5-C182-544A16C35C12}"/>
               </a:ext>
             </a:extLst>
           </p:cNvPr>
@@ -7968,8 +8117,8 @@
         </p:nvCxnSpPr>
         <p:spPr>
           <a:xfrm>
-            <a:off x="6130956" y="3057276"/>
-            <a:ext cx="882000" cy="0"/>
+            <a:off x="7038732" y="3348822"/>
+            <a:ext cx="2088000" cy="0"/>
           </a:xfrm>
           <a:prstGeom prst="straightConnector1">
             <a:avLst/>
@@ -7998,10 +8147,10 @@
       </p:cxnSp>
       <p:sp>
         <p:nvSpPr>
-          <p:cNvPr id="30" name="TextBox 29">
-            <a:extLst>
-              <a:ext uri="{FF2B5EF4-FFF2-40B4-BE49-F238E27FC236}">
-                <a16:creationId xmlns:a16="http://schemas.microsoft.com/office/drawing/2014/main" id="{7411CC50-CB54-E1A9-3DDF-6DDF73471320}"/>
+          <p:cNvPr id="36" name="TextBox 35">
+            <a:extLst>
+              <a:ext uri="{FF2B5EF4-FFF2-40B4-BE49-F238E27FC236}">
+                <a16:creationId xmlns:a16="http://schemas.microsoft.com/office/drawing/2014/main" id="{ABD31D1A-CBB0-FB68-AB0C-6DAB29A39577}"/>
               </a:ext>
             </a:extLst>
           </p:cNvPr>
@@ -8010,8 +8159,8 @@
         </p:nvSpPr>
         <p:spPr>
           <a:xfrm>
-            <a:off x="6234236" y="2751588"/>
-            <a:ext cx="698846" cy="338554"/>
+            <a:off x="7520892" y="3043133"/>
+            <a:ext cx="1173527" cy="338554"/>
           </a:xfrm>
           <a:prstGeom prst="rect">
             <a:avLst/>
@@ -8027,17 +8176,17 @@
             <a:pPr algn="ctr"/>
             <a:r>
               <a:rPr lang="en-US" sz="1600" dirty="0"/>
-              <a:t>Result</a:t>
+              <a:t>PSP request</a:t>
             </a:r>
           </a:p>
         </p:txBody>
       </p:sp>
       <p:cxnSp>
         <p:nvCxnSpPr>
-          <p:cNvPr id="34" name="Straight Arrow Connector 33">
-            <a:extLst>
-              <a:ext uri="{FF2B5EF4-FFF2-40B4-BE49-F238E27FC236}">
-                <a16:creationId xmlns:a16="http://schemas.microsoft.com/office/drawing/2014/main" id="{3A8987B3-24BB-BBB5-C182-544A16C35C12}"/>
+          <p:cNvPr id="37" name="Straight Arrow Connector 36">
+            <a:extLst>
+              <a:ext uri="{FF2B5EF4-FFF2-40B4-BE49-F238E27FC236}">
+                <a16:creationId xmlns:a16="http://schemas.microsoft.com/office/drawing/2014/main" id="{50F0F950-0C86-121B-7BD5-7562C2731672}"/>
               </a:ext>
             </a:extLst>
           </p:cNvPr>
@@ -8048,8 +8197,8 @@
         </p:nvCxnSpPr>
         <p:spPr>
           <a:xfrm>
-            <a:off x="7038732" y="3398517"/>
-            <a:ext cx="2088000" cy="0"/>
+            <a:off x="9169013" y="3690068"/>
+            <a:ext cx="1656000" cy="0"/>
           </a:xfrm>
           <a:prstGeom prst="straightConnector1">
             <a:avLst/>
@@ -8078,10 +8227,10 @@
       </p:cxnSp>
       <p:sp>
         <p:nvSpPr>
-          <p:cNvPr id="36" name="TextBox 35">
-            <a:extLst>
-              <a:ext uri="{FF2B5EF4-FFF2-40B4-BE49-F238E27FC236}">
-                <a16:creationId xmlns:a16="http://schemas.microsoft.com/office/drawing/2014/main" id="{ABD31D1A-CBB0-FB68-AB0C-6DAB29A39577}"/>
+          <p:cNvPr id="44" name="TextBox 43">
+            <a:extLst>
+              <a:ext uri="{FF2B5EF4-FFF2-40B4-BE49-F238E27FC236}">
+                <a16:creationId xmlns:a16="http://schemas.microsoft.com/office/drawing/2014/main" id="{940B3832-9B7F-3692-B7A6-1FA7603091BA}"/>
               </a:ext>
             </a:extLst>
           </p:cNvPr>
@@ -8090,8 +8239,8 @@
         </p:nvSpPr>
         <p:spPr>
           <a:xfrm>
-            <a:off x="7520892" y="3092828"/>
-            <a:ext cx="1173527" cy="338554"/>
+            <a:off x="9318863" y="3384379"/>
+            <a:ext cx="1361078" cy="338554"/>
           </a:xfrm>
           <a:prstGeom prst="rect">
             <a:avLst/>
@@ -8107,61 +8256,17 @@
             <a:pPr algn="ctr"/>
             <a:r>
               <a:rPr lang="en-US" sz="1600" dirty="0"/>
-              <a:t>PSP request</a:t>
-            </a:r>
-          </a:p>
-        </p:txBody>
-      </p:sp>
-      <p:cxnSp>
-        <p:nvCxnSpPr>
-          <p:cNvPr id="37" name="Straight Arrow Connector 36">
-            <a:extLst>
-              <a:ext uri="{FF2B5EF4-FFF2-40B4-BE49-F238E27FC236}">
-                <a16:creationId xmlns:a16="http://schemas.microsoft.com/office/drawing/2014/main" id="{50F0F950-0C86-121B-7BD5-7562C2731672}"/>
-              </a:ext>
-            </a:extLst>
-          </p:cNvPr>
-          <p:cNvCxnSpPr>
-            <a:cxnSpLocks/>
-          </p:cNvCxnSpPr>
-          <p:nvPr/>
-        </p:nvCxnSpPr>
-        <p:spPr>
-          <a:xfrm>
-            <a:off x="9169013" y="3739763"/>
-            <a:ext cx="1656000" cy="0"/>
-          </a:xfrm>
-          <a:prstGeom prst="straightConnector1">
-            <a:avLst/>
-          </a:prstGeom>
-          <a:ln w="6350">
-            <a:solidFill>
-              <a:schemeClr val="tx1"/>
-            </a:solidFill>
-            <a:tailEnd type="triangle"/>
-          </a:ln>
-        </p:spPr>
-        <p:style>
-          <a:lnRef idx="1">
-            <a:schemeClr val="accent1"/>
-          </a:lnRef>
-          <a:fillRef idx="0">
-            <a:schemeClr val="accent1"/>
-          </a:fillRef>
-          <a:effectRef idx="0">
-            <a:schemeClr val="accent1"/>
-          </a:effectRef>
-          <a:fontRef idx="minor">
-            <a:schemeClr val="tx1"/>
-          </a:fontRef>
-        </p:style>
-      </p:cxnSp>
-      <p:sp>
-        <p:nvSpPr>
-          <p:cNvPr id="44" name="TextBox 43">
-            <a:extLst>
-              <a:ext uri="{FF2B5EF4-FFF2-40B4-BE49-F238E27FC236}">
-                <a16:creationId xmlns:a16="http://schemas.microsoft.com/office/drawing/2014/main" id="{940B3832-9B7F-3692-B7A6-1FA7603091BA}"/>
+              <a:t>Issuer request</a:t>
+            </a:r>
+          </a:p>
+        </p:txBody>
+      </p:sp>
+      <p:sp>
+        <p:nvSpPr>
+          <p:cNvPr id="35" name="TextBox 34">
+            <a:extLst>
+              <a:ext uri="{FF2B5EF4-FFF2-40B4-BE49-F238E27FC236}">
+                <a16:creationId xmlns:a16="http://schemas.microsoft.com/office/drawing/2014/main" id="{3AF39C59-067B-FA5B-8F1F-3704CCB0B769}"/>
               </a:ext>
             </a:extLst>
           </p:cNvPr>
@@ -8170,43 +8275,7 @@
         </p:nvSpPr>
         <p:spPr>
           <a:xfrm>
-            <a:off x="9318863" y="3434074"/>
-            <a:ext cx="1361078" cy="338554"/>
-          </a:xfrm>
-          <a:prstGeom prst="rect">
-            <a:avLst/>
-          </a:prstGeom>
-          <a:noFill/>
-        </p:spPr>
-        <p:txBody>
-          <a:bodyPr wrap="none" rtlCol="0">
-            <a:spAutoFit/>
-          </a:bodyPr>
-          <a:lstStyle/>
-          <a:p>
-            <a:pPr algn="ctr"/>
-            <a:r>
-              <a:rPr lang="en-US" sz="1600" dirty="0"/>
-              <a:t>Issuer request</a:t>
-            </a:r>
-          </a:p>
-        </p:txBody>
-      </p:sp>
-      <p:sp>
-        <p:nvSpPr>
-          <p:cNvPr id="35" name="TextBox 34">
-            <a:extLst>
-              <a:ext uri="{FF2B5EF4-FFF2-40B4-BE49-F238E27FC236}">
-                <a16:creationId xmlns:a16="http://schemas.microsoft.com/office/drawing/2014/main" id="{3AF39C59-067B-FA5B-8F1F-3704CCB0B769}"/>
-              </a:ext>
-            </a:extLst>
-          </p:cNvPr>
-          <p:cNvSpPr txBox="1"/>
-          <p:nvPr/>
-        </p:nvSpPr>
-        <p:spPr>
-          <a:xfrm>
-            <a:off x="9912294" y="4037601"/>
+            <a:off x="9902355" y="3997845"/>
             <a:ext cx="1900905" cy="505523"/>
           </a:xfrm>
           <a:prstGeom prst="rect">
@@ -8304,7 +8373,7 @@
         </p:nvSpPr>
         <p:spPr>
           <a:xfrm>
-            <a:off x="1137651" y="3685197"/>
+            <a:off x="1147591" y="4480328"/>
             <a:ext cx="2010487" cy="505267"/>
           </a:xfrm>
           <a:prstGeom prst="rect">
@@ -8356,10 +8425,10 @@
       </p:sp>
       <p:sp>
         <p:nvSpPr>
-          <p:cNvPr id="5" name="TextBox 4">
-            <a:extLst>
-              <a:ext uri="{FF2B5EF4-FFF2-40B4-BE49-F238E27FC236}">
-                <a16:creationId xmlns:a16="http://schemas.microsoft.com/office/drawing/2014/main" id="{A093A70F-3C77-07A1-3F38-E4254B3684D0}"/>
+          <p:cNvPr id="47" name="TextBox 46">
+            <a:extLst>
+              <a:ext uri="{FF2B5EF4-FFF2-40B4-BE49-F238E27FC236}">
+                <a16:creationId xmlns:a16="http://schemas.microsoft.com/office/drawing/2014/main" id="{5B1D64AD-DC43-E68D-9097-C86644756CEE}"/>
               </a:ext>
             </a:extLst>
           </p:cNvPr>
@@ -8368,8 +8437,8 @@
         </p:nvSpPr>
         <p:spPr>
           <a:xfrm>
-            <a:off x="1161351" y="5435697"/>
-            <a:ext cx="1982851" cy="300339"/>
+            <a:off x="10023524" y="4829305"/>
+            <a:ext cx="1645323" cy="300339"/>
           </a:xfrm>
           <a:prstGeom prst="rect">
             <a:avLst/>
@@ -8398,55 +8467,6 @@
             </a:pPr>
             <a:r>
               <a:rPr lang="en-US" sz="1600" dirty="0"/>
-              <a:t>Encrypt authorization</a:t>
-            </a:r>
-          </a:p>
-        </p:txBody>
-      </p:sp>
-      <p:sp>
-        <p:nvSpPr>
-          <p:cNvPr id="47" name="TextBox 46">
-            <a:extLst>
-              <a:ext uri="{FF2B5EF4-FFF2-40B4-BE49-F238E27FC236}">
-                <a16:creationId xmlns:a16="http://schemas.microsoft.com/office/drawing/2014/main" id="{5B1D64AD-DC43-E68D-9097-C86644756CEE}"/>
-              </a:ext>
-            </a:extLst>
-          </p:cNvPr>
-          <p:cNvSpPr txBox="1"/>
-          <p:nvPr/>
-        </p:nvSpPr>
-        <p:spPr>
-          <a:xfrm>
-            <a:off x="10023524" y="4869061"/>
-            <a:ext cx="1645323" cy="300339"/>
-          </a:xfrm>
-          <a:prstGeom prst="rect">
-            <a:avLst/>
-          </a:prstGeom>
-          <a:solidFill>
-            <a:schemeClr val="bg1"/>
-          </a:solidFill>
-          <a:ln>
-            <a:solidFill>
-              <a:schemeClr val="bg1">
-                <a:lumMod val="75000"/>
-              </a:schemeClr>
-            </a:solidFill>
-          </a:ln>
-        </p:spPr>
-        <p:txBody>
-          <a:bodyPr wrap="none" rtlCol="0" anchor="ctr" anchorCtr="0">
-            <a:spAutoFit/>
-          </a:bodyPr>
-          <a:lstStyle/>
-          <a:p>
-            <a:pPr algn="ctr">
-              <a:lnSpc>
-                <a:spcPts val="1600"/>
-              </a:lnSpc>
-            </a:pPr>
-            <a:r>
-              <a:rPr lang="en-US" sz="1600" dirty="0"/>
               <a:t>Perform payment</a:t>
             </a:r>
           </a:p>
@@ -8468,7 +8488,7 @@
         </p:nvCxnSpPr>
         <p:spPr>
           <a:xfrm flipH="1">
-            <a:off x="9182267" y="5591749"/>
+            <a:off x="9182267" y="5512237"/>
             <a:ext cx="1656000" cy="0"/>
           </a:xfrm>
           <a:prstGeom prst="straightConnector1">
@@ -8513,7 +8533,7 @@
         </p:nvCxnSpPr>
         <p:spPr>
           <a:xfrm flipH="1">
-            <a:off x="7058611" y="5932990"/>
+            <a:off x="7058611" y="5853478"/>
             <a:ext cx="2106000" cy="0"/>
           </a:xfrm>
           <a:prstGeom prst="straightConnector1">
@@ -8558,8 +8578,8 @@
         </p:nvCxnSpPr>
         <p:spPr>
           <a:xfrm flipH="1">
-            <a:off x="5153616" y="6264292"/>
-            <a:ext cx="1872000" cy="0"/>
+            <a:off x="5153616" y="6184780"/>
+            <a:ext cx="1879200" cy="0"/>
           </a:xfrm>
           <a:prstGeom prst="straightConnector1">
             <a:avLst/>
@@ -8601,7 +8621,7 @@
         </p:nvSpPr>
         <p:spPr>
           <a:xfrm>
-            <a:off x="9683528" y="5296005"/>
+            <a:off x="9683528" y="5246310"/>
             <a:ext cx="698012" cy="338554"/>
           </a:xfrm>
           <a:prstGeom prst="rect">
@@ -8637,7 +8657,7 @@
         </p:nvSpPr>
         <p:spPr>
           <a:xfrm>
-            <a:off x="7728835" y="5637246"/>
+            <a:off x="7728835" y="5557734"/>
             <a:ext cx="698012" cy="338554"/>
           </a:xfrm>
           <a:prstGeom prst="rect">
@@ -8673,8 +8693,8 @@
         </p:nvSpPr>
         <p:spPr>
           <a:xfrm>
-            <a:off x="5774142" y="5958609"/>
-            <a:ext cx="698012" cy="338554"/>
+            <a:off x="5396029" y="5879097"/>
+            <a:ext cx="1454245" cy="338554"/>
           </a:xfrm>
           <a:prstGeom prst="rect">
             <a:avLst/>
@@ -8690,7 +8710,7 @@
             <a:pPr algn="ctr"/>
             <a:r>
               <a:rPr lang="en-US" sz="1600" dirty="0"/>
-              <a:t>Status</a:t>
+              <a:t>Status (to user)</a:t>
             </a:r>
           </a:p>
         </p:txBody>
@@ -8942,10 +8962,1029 @@
           </p:spPr>
         </p:pic>
       </p:grpSp>
+      <p:sp>
+        <p:nvSpPr>
+          <p:cNvPr id="3" name="Rectangle: Rounded Corners 2">
+            <a:extLst>
+              <a:ext uri="{FF2B5EF4-FFF2-40B4-BE49-F238E27FC236}">
+                <a16:creationId xmlns:a16="http://schemas.microsoft.com/office/drawing/2014/main" id="{E43E6AF3-B417-DE07-F95D-8CF08B8F453D}"/>
+              </a:ext>
+            </a:extLst>
+          </p:cNvPr>
+          <p:cNvSpPr/>
+          <p:nvPr/>
+        </p:nvSpPr>
+        <p:spPr>
+          <a:xfrm>
+            <a:off x="4309463" y="2707075"/>
+            <a:ext cx="1624571" cy="1392075"/>
+          </a:xfrm>
+          <a:prstGeom prst="roundRect">
+            <a:avLst>
+              <a:gd name="adj" fmla="val 11108"/>
+            </a:avLst>
+          </a:prstGeom>
+          <a:solidFill>
+            <a:schemeClr val="accent5">
+              <a:lumMod val="20000"/>
+              <a:lumOff val="80000"/>
+            </a:schemeClr>
+          </a:solidFill>
+          <a:ln>
+            <a:solidFill>
+              <a:schemeClr val="tx1">
+                <a:lumMod val="75000"/>
+                <a:lumOff val="25000"/>
+              </a:schemeClr>
+            </a:solidFill>
+          </a:ln>
+        </p:spPr>
+        <p:style>
+          <a:lnRef idx="2">
+            <a:schemeClr val="accent1">
+              <a:shade val="50000"/>
+            </a:schemeClr>
+          </a:lnRef>
+          <a:fillRef idx="1">
+            <a:schemeClr val="accent1"/>
+          </a:fillRef>
+          <a:effectRef idx="0">
+            <a:schemeClr val="accent1"/>
+          </a:effectRef>
+          <a:fontRef idx="minor">
+            <a:schemeClr val="lt1"/>
+          </a:fontRef>
+        </p:style>
+        <p:txBody>
+          <a:bodyPr wrap="none" lIns="72000" tIns="36000" rIns="72000" bIns="36000" rtlCol="0" anchor="ctr">
+            <a:spAutoFit/>
+          </a:bodyPr>
+          <a:lstStyle/>
+          <a:p>
+            <a:pPr algn="ctr"/>
+            <a:endParaRPr lang="en-US" sz="1600" noProof="1">
+              <a:solidFill>
+                <a:schemeClr val="tx1"/>
+              </a:solidFill>
+            </a:endParaRPr>
+          </a:p>
+          <a:p>
+            <a:pPr algn="ctr"/>
+            <a:r>
+              <a:rPr lang="en-US" sz="1600" noProof="1">
+                <a:solidFill>
+                  <a:schemeClr val="tx1"/>
+                </a:solidFill>
+              </a:rPr>
+              <a:t>W3C</a:t>
+            </a:r>
+            <a:br>
+              <a:rPr lang="en-US" sz="1600" noProof="1">
+                <a:solidFill>
+                  <a:schemeClr val="tx1"/>
+                </a:solidFill>
+              </a:rPr>
+            </a:br>
+            <a:r>
+              <a:rPr lang="en-US" sz="1600" noProof="1">
+                <a:solidFill>
+                  <a:schemeClr val="tx1"/>
+                </a:solidFill>
+              </a:rPr>
+              <a:t>PaymentRequest</a:t>
+            </a:r>
+            <a:br>
+              <a:rPr lang="en-US" sz="1600" noProof="1">
+                <a:solidFill>
+                  <a:schemeClr val="tx1"/>
+                </a:solidFill>
+              </a:rPr>
+            </a:br>
+            <a:r>
+              <a:rPr lang="en-US" sz="1600" noProof="1">
+                <a:solidFill>
+                  <a:schemeClr val="tx1"/>
+                </a:solidFill>
+              </a:rPr>
+              <a:t>API</a:t>
+            </a:r>
+          </a:p>
+          <a:p>
+            <a:pPr algn="ctr"/>
+            <a:endParaRPr lang="en-US" sz="1600" dirty="0">
+              <a:solidFill>
+                <a:schemeClr val="tx1"/>
+              </a:solidFill>
+            </a:endParaRPr>
+          </a:p>
+        </p:txBody>
+      </p:sp>
+      <p:sp>
+        <p:nvSpPr>
+          <p:cNvPr id="15" name="Rectangle 14">
+            <a:extLst>
+              <a:ext uri="{FF2B5EF4-FFF2-40B4-BE49-F238E27FC236}">
+                <a16:creationId xmlns:a16="http://schemas.microsoft.com/office/drawing/2014/main" id="{8FD9E1B4-C11F-83A8-5E7F-39FB6A16A7DF}"/>
+              </a:ext>
+            </a:extLst>
+          </p:cNvPr>
+          <p:cNvSpPr/>
+          <p:nvPr/>
+        </p:nvSpPr>
+        <p:spPr>
+          <a:xfrm>
+            <a:off x="1662938" y="3271562"/>
+            <a:ext cx="984153" cy="391628"/>
+          </a:xfrm>
+          <a:prstGeom prst="rect">
+            <a:avLst/>
+          </a:prstGeom>
+          <a:solidFill>
+            <a:schemeClr val="accent2">
+              <a:lumMod val="20000"/>
+              <a:lumOff val="80000"/>
+            </a:schemeClr>
+          </a:solidFill>
+          <a:ln>
+            <a:solidFill>
+              <a:schemeClr val="tx1">
+                <a:lumMod val="75000"/>
+                <a:lumOff val="25000"/>
+              </a:schemeClr>
+            </a:solidFill>
+          </a:ln>
+        </p:spPr>
+        <p:style>
+          <a:lnRef idx="2">
+            <a:schemeClr val="accent1">
+              <a:shade val="50000"/>
+            </a:schemeClr>
+          </a:lnRef>
+          <a:fillRef idx="1">
+            <a:schemeClr val="accent1"/>
+          </a:fillRef>
+          <a:effectRef idx="0">
+            <a:schemeClr val="accent1"/>
+          </a:effectRef>
+          <a:fontRef idx="minor">
+            <a:schemeClr val="lt1"/>
+          </a:fontRef>
+        </p:style>
+        <p:txBody>
+          <a:bodyPr wrap="none" lIns="108000" tIns="72000" rIns="108000" bIns="72000" rtlCol="0" anchor="ctr">
+            <a:spAutoFit/>
+          </a:bodyPr>
+          <a:lstStyle/>
+          <a:p>
+            <a:pPr algn="ctr"/>
+            <a:r>
+              <a:rPr lang="en-US" sz="1600" noProof="1">
+                <a:solidFill>
+                  <a:schemeClr val="tx1"/>
+                </a:solidFill>
+              </a:rPr>
+              <a:t>Wallet UI</a:t>
+            </a:r>
+            <a:endParaRPr lang="en-US" sz="1600" dirty="0">
+              <a:solidFill>
+                <a:schemeClr val="tx1"/>
+              </a:solidFill>
+            </a:endParaRPr>
+          </a:p>
+        </p:txBody>
+      </p:sp>
+      <p:cxnSp>
+        <p:nvCxnSpPr>
+          <p:cNvPr id="43" name="Connector: Elbow 42">
+            <a:extLst>
+              <a:ext uri="{FF2B5EF4-FFF2-40B4-BE49-F238E27FC236}">
+                <a16:creationId xmlns:a16="http://schemas.microsoft.com/office/drawing/2014/main" id="{CBC052DD-352D-749F-AE15-4FCEC8F7D71B}"/>
+              </a:ext>
+            </a:extLst>
+          </p:cNvPr>
+          <p:cNvCxnSpPr>
+            <a:cxnSpLocks/>
+          </p:cNvCxnSpPr>
+          <p:nvPr/>
+        </p:nvCxnSpPr>
+        <p:spPr>
+          <a:xfrm flipV="1">
+            <a:off x="3117600" y="3822183"/>
+            <a:ext cx="1188000" cy="2354400"/>
+          </a:xfrm>
+          <a:prstGeom prst="bentConnector3">
+            <a:avLst>
+              <a:gd name="adj1" fmla="val 72798"/>
+            </a:avLst>
+          </a:prstGeom>
+          <a:ln>
+            <a:solidFill>
+              <a:schemeClr val="tx1"/>
+            </a:solidFill>
+            <a:tailEnd type="triangle"/>
+          </a:ln>
+        </p:spPr>
+        <p:style>
+          <a:lnRef idx="1">
+            <a:schemeClr val="accent1"/>
+          </a:lnRef>
+          <a:fillRef idx="0">
+            <a:schemeClr val="accent1"/>
+          </a:fillRef>
+          <a:effectRef idx="0">
+            <a:schemeClr val="accent1"/>
+          </a:effectRef>
+          <a:fontRef idx="minor">
+            <a:schemeClr val="tx1"/>
+          </a:fontRef>
+        </p:style>
+      </p:cxnSp>
+      <p:sp>
+        <p:nvSpPr>
+          <p:cNvPr id="5" name="TextBox 4">
+            <a:extLst>
+              <a:ext uri="{FF2B5EF4-FFF2-40B4-BE49-F238E27FC236}">
+                <a16:creationId xmlns:a16="http://schemas.microsoft.com/office/drawing/2014/main" id="{A093A70F-3C77-07A1-3F38-E4254B3684D0}"/>
+              </a:ext>
+            </a:extLst>
+          </p:cNvPr>
+          <p:cNvSpPr txBox="1"/>
+          <p:nvPr/>
+        </p:nvSpPr>
+        <p:spPr>
+          <a:xfrm>
+            <a:off x="1161352" y="6022104"/>
+            <a:ext cx="1982851" cy="300339"/>
+          </a:xfrm>
+          <a:prstGeom prst="rect">
+            <a:avLst/>
+          </a:prstGeom>
+          <a:solidFill>
+            <a:schemeClr val="bg1"/>
+          </a:solidFill>
+          <a:ln>
+            <a:solidFill>
+              <a:schemeClr val="bg1">
+                <a:lumMod val="75000"/>
+              </a:schemeClr>
+            </a:solidFill>
+          </a:ln>
+        </p:spPr>
+        <p:txBody>
+          <a:bodyPr wrap="none" rtlCol="0" anchor="ctr" anchorCtr="0">
+            <a:spAutoFit/>
+          </a:bodyPr>
+          <a:lstStyle/>
+          <a:p>
+            <a:pPr algn="ctr">
+              <a:lnSpc>
+                <a:spcPts val="1600"/>
+              </a:lnSpc>
+            </a:pPr>
+            <a:r>
+              <a:rPr lang="en-US" sz="1600" dirty="0"/>
+              <a:t>Encrypt authorization</a:t>
+            </a:r>
+          </a:p>
+        </p:txBody>
+      </p:sp>
+      <p:cxnSp>
+        <p:nvCxnSpPr>
+          <p:cNvPr id="80" name="Straight Arrow Connector 79">
+            <a:extLst>
+              <a:ext uri="{FF2B5EF4-FFF2-40B4-BE49-F238E27FC236}">
+                <a16:creationId xmlns:a16="http://schemas.microsoft.com/office/drawing/2014/main" id="{40F49B47-FE5C-C3BB-BCE7-D32AF1CA3483}"/>
+              </a:ext>
+            </a:extLst>
+          </p:cNvPr>
+          <p:cNvCxnSpPr>
+            <a:cxnSpLocks/>
+          </p:cNvCxnSpPr>
+          <p:nvPr/>
+        </p:nvCxnSpPr>
+        <p:spPr>
+          <a:xfrm>
+            <a:off x="688851" y="4292272"/>
+            <a:ext cx="1458000" cy="0"/>
+          </a:xfrm>
+          <a:prstGeom prst="straightConnector1">
+            <a:avLst/>
+          </a:prstGeom>
+          <a:ln w="12700">
+            <a:solidFill>
+              <a:schemeClr val="accent2">
+                <a:lumMod val="75000"/>
+              </a:schemeClr>
+            </a:solidFill>
+            <a:prstDash val="dash"/>
+            <a:tailEnd type="triangle"/>
+          </a:ln>
+        </p:spPr>
+        <p:style>
+          <a:lnRef idx="1">
+            <a:schemeClr val="accent1"/>
+          </a:lnRef>
+          <a:fillRef idx="0">
+            <a:schemeClr val="accent1"/>
+          </a:fillRef>
+          <a:effectRef idx="0">
+            <a:schemeClr val="accent1"/>
+          </a:effectRef>
+          <a:fontRef idx="minor">
+            <a:schemeClr val="tx1"/>
+          </a:fontRef>
+        </p:style>
+      </p:cxnSp>
+      <p:sp>
+        <p:nvSpPr>
+          <p:cNvPr id="81" name="TextBox 80">
+            <a:extLst>
+              <a:ext uri="{FF2B5EF4-FFF2-40B4-BE49-F238E27FC236}">
+                <a16:creationId xmlns:a16="http://schemas.microsoft.com/office/drawing/2014/main" id="{F18B83B2-9960-16BF-14D1-E7BDD9E6CD66}"/>
+              </a:ext>
+            </a:extLst>
+          </p:cNvPr>
+          <p:cNvSpPr txBox="1"/>
+          <p:nvPr/>
+        </p:nvSpPr>
+        <p:spPr>
+          <a:xfrm>
+            <a:off x="881996" y="5120958"/>
+            <a:ext cx="2548198" cy="300339"/>
+          </a:xfrm>
+          <a:prstGeom prst="rect">
+            <a:avLst/>
+          </a:prstGeom>
+          <a:solidFill>
+            <a:schemeClr val="bg1"/>
+          </a:solidFill>
+          <a:ln>
+            <a:solidFill>
+              <a:schemeClr val="bg1">
+                <a:lumMod val="75000"/>
+              </a:schemeClr>
+            </a:solidFill>
+          </a:ln>
+        </p:spPr>
+        <p:txBody>
+          <a:bodyPr wrap="none" rtlCol="0" anchor="ctr" anchorCtr="0">
+            <a:spAutoFit/>
+          </a:bodyPr>
+          <a:lstStyle/>
+          <a:p>
+            <a:pPr algn="ctr">
+              <a:lnSpc>
+                <a:spcPts val="1600"/>
+              </a:lnSpc>
+            </a:pPr>
+            <a:r>
+              <a:rPr lang="en-US" sz="1600" dirty="0"/>
+              <a:t>Collect payment data to sign</a:t>
+            </a:r>
+          </a:p>
+        </p:txBody>
+      </p:sp>
     </p:spTree>
     <p:extLst>
       <p:ext uri="{BB962C8B-B14F-4D97-AF65-F5344CB8AC3E}">
         <p14:creationId xmlns:p14="http://schemas.microsoft.com/office/powerpoint/2010/main" val="2467635619"/>
+      </p:ext>
+    </p:extLst>
+  </p:cSld>
+  <p:clrMapOvr>
+    <a:masterClrMapping/>
+  </p:clrMapOvr>
+</p:sld>
+</file>
+
+<file path=ppt/slides/slide4.xml><?xml version="1.0" encoding="utf-8"?>
+<p:sld xmlns:a="http://schemas.openxmlformats.org/drawingml/2006/main" xmlns:r="http://schemas.openxmlformats.org/officeDocument/2006/relationships" xmlns:p="http://schemas.openxmlformats.org/presentationml/2006/main">
+  <p:cSld>
+    <p:spTree>
+      <p:nvGrpSpPr>
+        <p:cNvPr id="1" name=""/>
+        <p:cNvGrpSpPr/>
+        <p:nvPr/>
+      </p:nvGrpSpPr>
+      <p:grpSpPr>
+        <a:xfrm>
+          <a:off x="0" y="0"/>
+          <a:ext cx="0" cy="0"/>
+          <a:chOff x="0" y="0"/>
+          <a:chExt cx="0" cy="0"/>
+        </a:xfrm>
+      </p:grpSpPr>
+      <p:sp>
+        <p:nvSpPr>
+          <p:cNvPr id="4" name="TextBox 3">
+            <a:extLst>
+              <a:ext uri="{FF2B5EF4-FFF2-40B4-BE49-F238E27FC236}">
+                <a16:creationId xmlns:a16="http://schemas.microsoft.com/office/drawing/2014/main" id="{E8061992-EA1A-B21C-F268-8EE3B525AF3E}"/>
+              </a:ext>
+            </a:extLst>
+          </p:cNvPr>
+          <p:cNvSpPr txBox="1"/>
+          <p:nvPr/>
+        </p:nvSpPr>
+        <p:spPr>
+          <a:xfrm>
+            <a:off x="4221936" y="90559"/>
+            <a:ext cx="3748141" cy="369332"/>
+          </a:xfrm>
+          <a:prstGeom prst="rect">
+            <a:avLst/>
+          </a:prstGeom>
+          <a:noFill/>
+        </p:spPr>
+        <p:txBody>
+          <a:bodyPr wrap="none" rtlCol="0">
+            <a:spAutoFit/>
+          </a:bodyPr>
+          <a:lstStyle/>
+          <a:p>
+            <a:pPr algn="ctr"/>
+            <a:r>
+              <a:rPr lang="en-US" dirty="0">
+                <a:latin typeface="Roboto Medium" panose="02000000000000000000" pitchFamily="2" charset="0"/>
+                <a:ea typeface="Roboto Medium" panose="02000000000000000000" pitchFamily="2" charset="0"/>
+              </a:rPr>
+              <a:t>Wallet – </a:t>
+            </a:r>
+            <a:r>
+              <a:rPr lang="en-US" i="1" dirty="0">
+                <a:latin typeface="Roboto Medium" panose="02000000000000000000" pitchFamily="2" charset="0"/>
+                <a:ea typeface="Roboto Medium" panose="02000000000000000000" pitchFamily="2" charset="0"/>
+              </a:rPr>
+              <a:t>Non-normative UI Sample</a:t>
+            </a:r>
+          </a:p>
+        </p:txBody>
+      </p:sp>
+      <p:pic>
+        <p:nvPicPr>
+          <p:cNvPr id="23" name="Graphic 22">
+            <a:extLst>
+              <a:ext uri="{FF2B5EF4-FFF2-40B4-BE49-F238E27FC236}">
+                <a16:creationId xmlns:a16="http://schemas.microsoft.com/office/drawing/2014/main" id="{C8185E9C-14B7-D066-06CA-06B1A621F6D3}"/>
+              </a:ext>
+            </a:extLst>
+          </p:cNvPr>
+          <p:cNvPicPr>
+            <a:picLocks noChangeAspect="1"/>
+          </p:cNvPicPr>
+          <p:nvPr/>
+        </p:nvPicPr>
+        <p:blipFill>
+          <a:blip r:embed="rId2">
+            <a:extLst>
+              <a:ext uri="{28A0092B-C50C-407E-A947-70E740481C1C}">
+                <a14:useLocalDpi xmlns:a14="http://schemas.microsoft.com/office/drawing/2010/main" val="0"/>
+              </a:ext>
+              <a:ext uri="{96DAC541-7B7A-43D3-8B79-37D633B846F1}">
+                <asvg:svgBlip xmlns:asvg="http://schemas.microsoft.com/office/drawing/2016/SVG/main" r:embed="rId3"/>
+              </a:ext>
+            </a:extLst>
+          </a:blip>
+          <a:stretch>
+            <a:fillRect/>
+          </a:stretch>
+        </p:blipFill>
+        <p:spPr>
+          <a:xfrm>
+            <a:off x="4191000" y="1047750"/>
+            <a:ext cx="3810000" cy="4762500"/>
+          </a:xfrm>
+          <a:prstGeom prst="rect">
+            <a:avLst/>
+          </a:prstGeom>
+          <a:effectLst>
+            <a:outerShdw blurRad="50800" dist="38100" dir="2700000" algn="tl" rotWithShape="0">
+              <a:prstClr val="black">
+                <a:alpha val="40000"/>
+              </a:prstClr>
+            </a:outerShdw>
+          </a:effectLst>
+        </p:spPr>
+      </p:pic>
+      <p:sp>
+        <p:nvSpPr>
+          <p:cNvPr id="68" name="TextBox 67">
+            <a:extLst>
+              <a:ext uri="{FF2B5EF4-FFF2-40B4-BE49-F238E27FC236}">
+                <a16:creationId xmlns:a16="http://schemas.microsoft.com/office/drawing/2014/main" id="{446385C6-BD63-6F47-EE9C-678D9F717C19}"/>
+              </a:ext>
+            </a:extLst>
+          </p:cNvPr>
+          <p:cNvSpPr txBox="1"/>
+          <p:nvPr/>
+        </p:nvSpPr>
+        <p:spPr>
+          <a:xfrm>
+            <a:off x="8469928" y="1027014"/>
+            <a:ext cx="1924694" cy="338554"/>
+          </a:xfrm>
+          <a:prstGeom prst="rect">
+            <a:avLst/>
+          </a:prstGeom>
+          <a:noFill/>
+        </p:spPr>
+        <p:txBody>
+          <a:bodyPr wrap="none" rtlCol="0">
+            <a:spAutoFit/>
+          </a:bodyPr>
+          <a:lstStyle/>
+          <a:p>
+            <a:r>
+              <a:rPr lang="en-US" sz="1600" dirty="0"/>
+              <a:t>Merchant host name</a:t>
+            </a:r>
+          </a:p>
+        </p:txBody>
+      </p:sp>
+      <p:sp>
+        <p:nvSpPr>
+          <p:cNvPr id="76" name="TextBox 75">
+            <a:extLst>
+              <a:ext uri="{FF2B5EF4-FFF2-40B4-BE49-F238E27FC236}">
+                <a16:creationId xmlns:a16="http://schemas.microsoft.com/office/drawing/2014/main" id="{480B23AA-93F3-E4CB-A85E-7A69A68BB20D}"/>
+              </a:ext>
+            </a:extLst>
+          </p:cNvPr>
+          <p:cNvSpPr txBox="1"/>
+          <p:nvPr/>
+        </p:nvSpPr>
+        <p:spPr>
+          <a:xfrm>
+            <a:off x="8469928" y="2200824"/>
+            <a:ext cx="2753703" cy="338554"/>
+          </a:xfrm>
+          <a:prstGeom prst="rect">
+            <a:avLst/>
+          </a:prstGeom>
+          <a:noFill/>
+        </p:spPr>
+        <p:txBody>
+          <a:bodyPr wrap="none" rtlCol="0">
+            <a:spAutoFit/>
+          </a:bodyPr>
+          <a:lstStyle/>
+          <a:p>
+            <a:r>
+              <a:rPr lang="en-US" sz="1600" dirty="0" err="1"/>
+              <a:t>Swipeable</a:t>
+            </a:r>
+            <a:r>
+              <a:rPr lang="en-US" sz="1600" dirty="0"/>
+              <a:t> list of virtual cards *</a:t>
+            </a:r>
+          </a:p>
+        </p:txBody>
+      </p:sp>
+      <p:sp>
+        <p:nvSpPr>
+          <p:cNvPr id="79" name="TextBox 78">
+            <a:extLst>
+              <a:ext uri="{FF2B5EF4-FFF2-40B4-BE49-F238E27FC236}">
+                <a16:creationId xmlns:a16="http://schemas.microsoft.com/office/drawing/2014/main" id="{1B3A955C-6693-862D-B4AE-5CA74DCFBC82}"/>
+              </a:ext>
+            </a:extLst>
+          </p:cNvPr>
+          <p:cNvSpPr txBox="1"/>
+          <p:nvPr/>
+        </p:nvSpPr>
+        <p:spPr>
+          <a:xfrm>
+            <a:off x="8469928" y="3435129"/>
+            <a:ext cx="2298771" cy="338554"/>
+          </a:xfrm>
+          <a:prstGeom prst="rect">
+            <a:avLst/>
+          </a:prstGeom>
+          <a:noFill/>
+        </p:spPr>
+        <p:txBody>
+          <a:bodyPr wrap="none" rtlCol="0">
+            <a:spAutoFit/>
+          </a:bodyPr>
+          <a:lstStyle/>
+          <a:p>
+            <a:r>
+              <a:rPr lang="en-US" sz="1600" dirty="0"/>
+              <a:t>Merchant common name</a:t>
+            </a:r>
+          </a:p>
+        </p:txBody>
+      </p:sp>
+      <p:sp>
+        <p:nvSpPr>
+          <p:cNvPr id="83" name="TextBox 82">
+            <a:extLst>
+              <a:ext uri="{FF2B5EF4-FFF2-40B4-BE49-F238E27FC236}">
+                <a16:creationId xmlns:a16="http://schemas.microsoft.com/office/drawing/2014/main" id="{5BCDA416-32FC-7B9D-7A24-AB24968126DC}"/>
+              </a:ext>
+            </a:extLst>
+          </p:cNvPr>
+          <p:cNvSpPr txBox="1"/>
+          <p:nvPr/>
+        </p:nvSpPr>
+        <p:spPr>
+          <a:xfrm>
+            <a:off x="8469928" y="3933021"/>
+            <a:ext cx="1420902" cy="338554"/>
+          </a:xfrm>
+          <a:prstGeom prst="rect">
+            <a:avLst/>
+          </a:prstGeom>
+          <a:noFill/>
+        </p:spPr>
+        <p:txBody>
+          <a:bodyPr wrap="none" rtlCol="0">
+            <a:spAutoFit/>
+          </a:bodyPr>
+          <a:lstStyle/>
+          <a:p>
+            <a:r>
+              <a:rPr lang="en-US" sz="1600" dirty="0"/>
+              <a:t>Amount to pay</a:t>
+            </a:r>
+          </a:p>
+        </p:txBody>
+      </p:sp>
+      <p:sp>
+        <p:nvSpPr>
+          <p:cNvPr id="86" name="TextBox 85">
+            <a:extLst>
+              <a:ext uri="{FF2B5EF4-FFF2-40B4-BE49-F238E27FC236}">
+                <a16:creationId xmlns:a16="http://schemas.microsoft.com/office/drawing/2014/main" id="{7FED50FE-267E-67F8-027F-2CD3F72629D9}"/>
+              </a:ext>
+            </a:extLst>
+          </p:cNvPr>
+          <p:cNvSpPr txBox="1"/>
+          <p:nvPr/>
+        </p:nvSpPr>
+        <p:spPr>
+          <a:xfrm>
+            <a:off x="8469928" y="4976891"/>
+            <a:ext cx="2754793" cy="338554"/>
+          </a:xfrm>
+          <a:prstGeom prst="rect">
+            <a:avLst/>
+          </a:prstGeom>
+          <a:noFill/>
+        </p:spPr>
+        <p:txBody>
+          <a:bodyPr wrap="none" rtlCol="0">
+            <a:spAutoFit/>
+          </a:bodyPr>
+          <a:lstStyle/>
+          <a:p>
+            <a:r>
+              <a:rPr lang="en-US" sz="1600" dirty="0"/>
+              <a:t>Activates the authorization key</a:t>
+            </a:r>
+          </a:p>
+        </p:txBody>
+      </p:sp>
+      <p:sp>
+        <p:nvSpPr>
+          <p:cNvPr id="6" name="Arrow: Left 5">
+            <a:extLst>
+              <a:ext uri="{FF2B5EF4-FFF2-40B4-BE49-F238E27FC236}">
+                <a16:creationId xmlns:a16="http://schemas.microsoft.com/office/drawing/2014/main" id="{3045FD59-B822-2D7C-7084-A2E96F8ED8E1}"/>
+              </a:ext>
+            </a:extLst>
+          </p:cNvPr>
+          <p:cNvSpPr/>
+          <p:nvPr/>
+        </p:nvSpPr>
+        <p:spPr>
+          <a:xfrm>
+            <a:off x="8116342" y="1123851"/>
+            <a:ext cx="324000" cy="154800"/>
+          </a:xfrm>
+          <a:prstGeom prst="leftArrow">
+            <a:avLst/>
+          </a:prstGeom>
+          <a:solidFill>
+            <a:schemeClr val="accent4">
+              <a:lumMod val="60000"/>
+              <a:lumOff val="40000"/>
+            </a:schemeClr>
+          </a:solidFill>
+          <a:ln>
+            <a:solidFill>
+              <a:schemeClr val="tx1">
+                <a:lumMod val="65000"/>
+                <a:lumOff val="35000"/>
+              </a:schemeClr>
+            </a:solidFill>
+          </a:ln>
+        </p:spPr>
+        <p:style>
+          <a:lnRef idx="2">
+            <a:schemeClr val="accent1">
+              <a:shade val="50000"/>
+            </a:schemeClr>
+          </a:lnRef>
+          <a:fillRef idx="1">
+            <a:schemeClr val="accent1"/>
+          </a:fillRef>
+          <a:effectRef idx="0">
+            <a:schemeClr val="accent1"/>
+          </a:effectRef>
+          <a:fontRef idx="minor">
+            <a:schemeClr val="lt1"/>
+          </a:fontRef>
+        </p:style>
+        <p:txBody>
+          <a:bodyPr rtlCol="0" anchor="ctr"/>
+          <a:lstStyle/>
+          <a:p>
+            <a:pPr algn="ctr"/>
+            <a:endParaRPr lang="en-US"/>
+          </a:p>
+        </p:txBody>
+      </p:sp>
+      <p:sp>
+        <p:nvSpPr>
+          <p:cNvPr id="7" name="Arrow: Left 6">
+            <a:extLst>
+              <a:ext uri="{FF2B5EF4-FFF2-40B4-BE49-F238E27FC236}">
+                <a16:creationId xmlns:a16="http://schemas.microsoft.com/office/drawing/2014/main" id="{75113224-47B3-A2F3-89CD-3AE1F9E4290C}"/>
+              </a:ext>
+            </a:extLst>
+          </p:cNvPr>
+          <p:cNvSpPr/>
+          <p:nvPr/>
+        </p:nvSpPr>
+        <p:spPr>
+          <a:xfrm>
+            <a:off x="8116342" y="2298325"/>
+            <a:ext cx="324000" cy="154800"/>
+          </a:xfrm>
+          <a:prstGeom prst="leftArrow">
+            <a:avLst/>
+          </a:prstGeom>
+          <a:solidFill>
+            <a:schemeClr val="accent4">
+              <a:lumMod val="60000"/>
+              <a:lumOff val="40000"/>
+            </a:schemeClr>
+          </a:solidFill>
+          <a:ln>
+            <a:solidFill>
+              <a:schemeClr val="tx1">
+                <a:lumMod val="65000"/>
+                <a:lumOff val="35000"/>
+              </a:schemeClr>
+            </a:solidFill>
+          </a:ln>
+        </p:spPr>
+        <p:style>
+          <a:lnRef idx="2">
+            <a:schemeClr val="accent1">
+              <a:shade val="50000"/>
+            </a:schemeClr>
+          </a:lnRef>
+          <a:fillRef idx="1">
+            <a:schemeClr val="accent1"/>
+          </a:fillRef>
+          <a:effectRef idx="0">
+            <a:schemeClr val="accent1"/>
+          </a:effectRef>
+          <a:fontRef idx="minor">
+            <a:schemeClr val="lt1"/>
+          </a:fontRef>
+        </p:style>
+        <p:txBody>
+          <a:bodyPr rtlCol="0" anchor="ctr"/>
+          <a:lstStyle/>
+          <a:p>
+            <a:pPr algn="ctr"/>
+            <a:endParaRPr lang="en-US"/>
+          </a:p>
+        </p:txBody>
+      </p:sp>
+      <p:sp>
+        <p:nvSpPr>
+          <p:cNvPr id="8" name="Arrow: Left 7">
+            <a:extLst>
+              <a:ext uri="{FF2B5EF4-FFF2-40B4-BE49-F238E27FC236}">
+                <a16:creationId xmlns:a16="http://schemas.microsoft.com/office/drawing/2014/main" id="{93FC0DC1-9366-964B-8D3D-974D829968A9}"/>
+              </a:ext>
+            </a:extLst>
+          </p:cNvPr>
+          <p:cNvSpPr/>
+          <p:nvPr/>
+        </p:nvSpPr>
+        <p:spPr>
+          <a:xfrm>
+            <a:off x="8116342" y="3532602"/>
+            <a:ext cx="324000" cy="154800"/>
+          </a:xfrm>
+          <a:prstGeom prst="leftArrow">
+            <a:avLst/>
+          </a:prstGeom>
+          <a:solidFill>
+            <a:schemeClr val="accent4">
+              <a:lumMod val="60000"/>
+              <a:lumOff val="40000"/>
+            </a:schemeClr>
+          </a:solidFill>
+          <a:ln>
+            <a:solidFill>
+              <a:schemeClr val="tx1">
+                <a:lumMod val="65000"/>
+                <a:lumOff val="35000"/>
+              </a:schemeClr>
+            </a:solidFill>
+          </a:ln>
+        </p:spPr>
+        <p:style>
+          <a:lnRef idx="2">
+            <a:schemeClr val="accent1">
+              <a:shade val="50000"/>
+            </a:schemeClr>
+          </a:lnRef>
+          <a:fillRef idx="1">
+            <a:schemeClr val="accent1"/>
+          </a:fillRef>
+          <a:effectRef idx="0">
+            <a:schemeClr val="accent1"/>
+          </a:effectRef>
+          <a:fontRef idx="minor">
+            <a:schemeClr val="lt1"/>
+          </a:fontRef>
+        </p:style>
+        <p:txBody>
+          <a:bodyPr rtlCol="0" anchor="ctr"/>
+          <a:lstStyle/>
+          <a:p>
+            <a:pPr algn="ctr"/>
+            <a:endParaRPr lang="en-US"/>
+          </a:p>
+        </p:txBody>
+      </p:sp>
+      <p:sp>
+        <p:nvSpPr>
+          <p:cNvPr id="9" name="Arrow: Left 8">
+            <a:extLst>
+              <a:ext uri="{FF2B5EF4-FFF2-40B4-BE49-F238E27FC236}">
+                <a16:creationId xmlns:a16="http://schemas.microsoft.com/office/drawing/2014/main" id="{C14AC479-71CA-1FE1-5910-5C1AB3847CC2}"/>
+              </a:ext>
+            </a:extLst>
+          </p:cNvPr>
+          <p:cNvSpPr/>
+          <p:nvPr/>
+        </p:nvSpPr>
+        <p:spPr>
+          <a:xfrm>
+            <a:off x="8116342" y="4023753"/>
+            <a:ext cx="324000" cy="154800"/>
+          </a:xfrm>
+          <a:prstGeom prst="leftArrow">
+            <a:avLst/>
+          </a:prstGeom>
+          <a:solidFill>
+            <a:schemeClr val="accent4">
+              <a:lumMod val="60000"/>
+              <a:lumOff val="40000"/>
+            </a:schemeClr>
+          </a:solidFill>
+          <a:ln>
+            <a:solidFill>
+              <a:schemeClr val="tx1">
+                <a:lumMod val="65000"/>
+                <a:lumOff val="35000"/>
+              </a:schemeClr>
+            </a:solidFill>
+          </a:ln>
+        </p:spPr>
+        <p:style>
+          <a:lnRef idx="2">
+            <a:schemeClr val="accent1">
+              <a:shade val="50000"/>
+            </a:schemeClr>
+          </a:lnRef>
+          <a:fillRef idx="1">
+            <a:schemeClr val="accent1"/>
+          </a:fillRef>
+          <a:effectRef idx="0">
+            <a:schemeClr val="accent1"/>
+          </a:effectRef>
+          <a:fontRef idx="minor">
+            <a:schemeClr val="lt1"/>
+          </a:fontRef>
+        </p:style>
+        <p:txBody>
+          <a:bodyPr rtlCol="0" anchor="ctr"/>
+          <a:lstStyle/>
+          <a:p>
+            <a:pPr algn="ctr"/>
+            <a:endParaRPr lang="en-US"/>
+          </a:p>
+        </p:txBody>
+      </p:sp>
+      <p:sp>
+        <p:nvSpPr>
+          <p:cNvPr id="10" name="Arrow: Left 9">
+            <a:extLst>
+              <a:ext uri="{FF2B5EF4-FFF2-40B4-BE49-F238E27FC236}">
+                <a16:creationId xmlns:a16="http://schemas.microsoft.com/office/drawing/2014/main" id="{4E4D7C86-762E-898B-D1CA-87B743C8C49F}"/>
+              </a:ext>
+            </a:extLst>
+          </p:cNvPr>
+          <p:cNvSpPr/>
+          <p:nvPr/>
+        </p:nvSpPr>
+        <p:spPr>
+          <a:xfrm>
+            <a:off x="8116342" y="5071335"/>
+            <a:ext cx="324000" cy="154800"/>
+          </a:xfrm>
+          <a:prstGeom prst="leftArrow">
+            <a:avLst/>
+          </a:prstGeom>
+          <a:solidFill>
+            <a:schemeClr val="accent4">
+              <a:lumMod val="60000"/>
+              <a:lumOff val="40000"/>
+            </a:schemeClr>
+          </a:solidFill>
+          <a:ln>
+            <a:solidFill>
+              <a:schemeClr val="tx1">
+                <a:lumMod val="65000"/>
+                <a:lumOff val="35000"/>
+              </a:schemeClr>
+            </a:solidFill>
+          </a:ln>
+        </p:spPr>
+        <p:style>
+          <a:lnRef idx="2">
+            <a:schemeClr val="accent1">
+              <a:shade val="50000"/>
+            </a:schemeClr>
+          </a:lnRef>
+          <a:fillRef idx="1">
+            <a:schemeClr val="accent1"/>
+          </a:fillRef>
+          <a:effectRef idx="0">
+            <a:schemeClr val="accent1"/>
+          </a:effectRef>
+          <a:fontRef idx="minor">
+            <a:schemeClr val="lt1"/>
+          </a:fontRef>
+        </p:style>
+        <p:txBody>
+          <a:bodyPr rtlCol="0" anchor="ctr"/>
+          <a:lstStyle/>
+          <a:p>
+            <a:pPr algn="ctr"/>
+            <a:endParaRPr lang="en-US"/>
+          </a:p>
+        </p:txBody>
+      </p:sp>
+      <p:sp>
+        <p:nvSpPr>
+          <p:cNvPr id="11" name="TextBox 10">
+            <a:extLst>
+              <a:ext uri="{FF2B5EF4-FFF2-40B4-BE49-F238E27FC236}">
+                <a16:creationId xmlns:a16="http://schemas.microsoft.com/office/drawing/2014/main" id="{B0F64557-2415-3409-7825-37F95F5EE0AA}"/>
+              </a:ext>
+            </a:extLst>
+          </p:cNvPr>
+          <p:cNvSpPr txBox="1"/>
+          <p:nvPr/>
+        </p:nvSpPr>
+        <p:spPr>
+          <a:xfrm>
+            <a:off x="2389799" y="6159903"/>
+            <a:ext cx="7460953" cy="338554"/>
+          </a:xfrm>
+          <a:prstGeom prst="rect">
+            <a:avLst/>
+          </a:prstGeom>
+          <a:noFill/>
+        </p:spPr>
+        <p:txBody>
+          <a:bodyPr wrap="none" rtlCol="0">
+            <a:spAutoFit/>
+          </a:bodyPr>
+          <a:lstStyle/>
+          <a:p>
+            <a:pPr algn="ctr"/>
+            <a:r>
+              <a:rPr lang="en-US" sz="1600" dirty="0"/>
+              <a:t>* Only cards matching the payment networks supported by the merchant will be shown</a:t>
+            </a:r>
+          </a:p>
+        </p:txBody>
+      </p:sp>
+    </p:spTree>
+    <p:extLst>
+      <p:ext uri="{BB962C8B-B14F-4D97-AF65-F5344CB8AC3E}">
+        <p14:creationId xmlns:p14="http://schemas.microsoft.com/office/powerpoint/2010/main" val="2526050694"/>
       </p:ext>
     </p:extLst>
   </p:cSld>

</xml_diff>

<commit_message>
Changed color on added/new items
</commit_message>
<xml_diff>
--- a/fido-wallet-a.rundgren.pptx
+++ b/fido-wallet-a.rundgren.pptx
@@ -472,7 +472,7 @@
           <a:p>
             <a:fld id="{FAE6055B-ABBD-4C0D-84D8-CCE0D097BF9D}" type="datetimeFigureOut">
               <a:rPr lang="en-US" smtClean="0"/>
-              <a:t>2022-11-03</a:t>
+              <a:t>2022-11-04</a:t>
             </a:fld>
             <a:endParaRPr lang="en-US"/>
           </a:p>
@@ -680,7 +680,7 @@
           <a:p>
             <a:fld id="{FAE6055B-ABBD-4C0D-84D8-CCE0D097BF9D}" type="datetimeFigureOut">
               <a:rPr lang="en-US" smtClean="0"/>
-              <a:t>2022-11-03</a:t>
+              <a:t>2022-11-04</a:t>
             </a:fld>
             <a:endParaRPr lang="en-US"/>
           </a:p>
@@ -878,7 +878,7 @@
           <a:p>
             <a:fld id="{FAE6055B-ABBD-4C0D-84D8-CCE0D097BF9D}" type="datetimeFigureOut">
               <a:rPr lang="en-US" smtClean="0"/>
-              <a:t>2022-11-03</a:t>
+              <a:t>2022-11-04</a:t>
             </a:fld>
             <a:endParaRPr lang="en-US"/>
           </a:p>
@@ -1153,7 +1153,7 @@
           <a:p>
             <a:fld id="{FAE6055B-ABBD-4C0D-84D8-CCE0D097BF9D}" type="datetimeFigureOut">
               <a:rPr lang="en-US" smtClean="0"/>
-              <a:t>2022-11-03</a:t>
+              <a:t>2022-11-04</a:t>
             </a:fld>
             <a:endParaRPr lang="en-US"/>
           </a:p>
@@ -1418,7 +1418,7 @@
           <a:p>
             <a:fld id="{FAE6055B-ABBD-4C0D-84D8-CCE0D097BF9D}" type="datetimeFigureOut">
               <a:rPr lang="en-US" smtClean="0"/>
-              <a:t>2022-11-03</a:t>
+              <a:t>2022-11-04</a:t>
             </a:fld>
             <a:endParaRPr lang="en-US"/>
           </a:p>
@@ -1830,7 +1830,7 @@
           <a:p>
             <a:fld id="{FAE6055B-ABBD-4C0D-84D8-CCE0D097BF9D}" type="datetimeFigureOut">
               <a:rPr lang="en-US" smtClean="0"/>
-              <a:t>2022-11-03</a:t>
+              <a:t>2022-11-04</a:t>
             </a:fld>
             <a:endParaRPr lang="en-US"/>
           </a:p>
@@ -1971,7 +1971,7 @@
           <a:p>
             <a:fld id="{FAE6055B-ABBD-4C0D-84D8-CCE0D097BF9D}" type="datetimeFigureOut">
               <a:rPr lang="en-US" smtClean="0"/>
-              <a:t>2022-11-03</a:t>
+              <a:t>2022-11-04</a:t>
             </a:fld>
             <a:endParaRPr lang="en-US"/>
           </a:p>
@@ -2084,7 +2084,7 @@
           <a:p>
             <a:fld id="{FAE6055B-ABBD-4C0D-84D8-CCE0D097BF9D}" type="datetimeFigureOut">
               <a:rPr lang="en-US" smtClean="0"/>
-              <a:t>2022-11-03</a:t>
+              <a:t>2022-11-04</a:t>
             </a:fld>
             <a:endParaRPr lang="en-US"/>
           </a:p>
@@ -2395,7 +2395,7 @@
           <a:p>
             <a:fld id="{FAE6055B-ABBD-4C0D-84D8-CCE0D097BF9D}" type="datetimeFigureOut">
               <a:rPr lang="en-US" smtClean="0"/>
-              <a:t>2022-11-03</a:t>
+              <a:t>2022-11-04</a:t>
             </a:fld>
             <a:endParaRPr lang="en-US"/>
           </a:p>
@@ -2683,7 +2683,7 @@
           <a:p>
             <a:fld id="{FAE6055B-ABBD-4C0D-84D8-CCE0D097BF9D}" type="datetimeFigureOut">
               <a:rPr lang="en-US" smtClean="0"/>
-              <a:t>2022-11-03</a:t>
+              <a:t>2022-11-04</a:t>
             </a:fld>
             <a:endParaRPr lang="en-US"/>
           </a:p>
@@ -2924,7 +2924,7 @@
           <a:p>
             <a:fld id="{FAE6055B-ABBD-4C0D-84D8-CCE0D097BF9D}" type="datetimeFigureOut">
               <a:rPr lang="en-US" smtClean="0"/>
-              <a:t>2022-11-03</a:t>
+              <a:t>2022-11-04</a:t>
             </a:fld>
             <a:endParaRPr lang="en-US"/>
           </a:p>
@@ -5927,10 +5927,7 @@
             </a:avLst>
           </a:prstGeom>
           <a:solidFill>
-            <a:schemeClr val="accent5">
-              <a:lumMod val="20000"/>
-              <a:lumOff val="80000"/>
-            </a:schemeClr>
+            <a:srgbClr val="FDF1E9"/>
           </a:solidFill>
           <a:ln>
             <a:solidFill>
@@ -9093,17 +9090,14 @@
         </p:nvSpPr>
         <p:spPr>
           <a:xfrm>
-            <a:off x="1662938" y="3201989"/>
-            <a:ext cx="984153" cy="391628"/>
+            <a:off x="1662940" y="3201989"/>
+            <a:ext cx="984152" cy="391628"/>
           </a:xfrm>
           <a:prstGeom prst="rect">
             <a:avLst/>
           </a:prstGeom>
           <a:solidFill>
-            <a:schemeClr val="accent2">
-              <a:lumMod val="20000"/>
-              <a:lumOff val="80000"/>
-            </a:schemeClr>
+            <a:srgbClr val="FDF1E9"/>
           </a:solidFill>
           <a:ln>
             <a:solidFill>

</xml_diff>